<commit_message>
Add Transition to SPA
</commit_message>
<xml_diff>
--- a/presentations/chapter-3/Practical Web Dev.pptx
+++ b/presentations/chapter-3/Practical Web Dev.pptx
@@ -5,11 +5,15 @@
     <p:sldMasterId id="2147483648" r:id="rId1"/>
   </p:sldMasterIdLst>
   <p:notesMasterIdLst>
-    <p:notesMasterId r:id="rId4"/>
+    <p:notesMasterId r:id="rId8"/>
   </p:notesMasterIdLst>
   <p:sldIdLst>
     <p:sldId id="408" r:id="rId2"/>
     <p:sldId id="409" r:id="rId3"/>
+    <p:sldId id="410" r:id="rId4"/>
+    <p:sldId id="411" r:id="rId5"/>
+    <p:sldId id="412" r:id="rId6"/>
+    <p:sldId id="413" r:id="rId7"/>
   </p:sldIdLst>
   <p:sldSz cx="12192000" cy="6858000"/>
   <p:notesSz cx="6858000" cy="9144000"/>
@@ -118,6 +122,10 @@
           <p14:sldIdLst>
             <p14:sldId id="408"/>
             <p14:sldId id="409"/>
+            <p14:sldId id="410"/>
+            <p14:sldId id="411"/>
+            <p14:sldId id="412"/>
+            <p14:sldId id="413"/>
           </p14:sldIdLst>
         </p14:section>
       </p14:sectionLst>
@@ -222,7 +230,7 @@
           <a:p>
             <a:fld id="{B53C1D94-E0DD-4250-8C1B-3D8C3DA9B2B6}" type="datetimeFigureOut">
               <a:rPr lang="he-IL" smtClean="0"/>
-              <a:t>כ"ז/סיון/תשע"ט</a:t>
+              <a:t>י"ח/תמוז/תשע"ט</a:t>
             </a:fld>
             <a:endParaRPr lang="he-IL"/>
           </a:p>
@@ -691,6 +699,2605 @@
 </p:notes>
 </file>
 
+<file path=ppt/notesSlides/notesSlide3.xml><?xml version="1.0" encoding="utf-8"?>
+<p:notes xmlns:a="http://schemas.openxmlformats.org/drawingml/2006/main" xmlns:r="http://schemas.openxmlformats.org/officeDocument/2006/relationships" xmlns:p="http://schemas.openxmlformats.org/presentationml/2006/main">
+  <p:cSld>
+    <p:spTree>
+      <p:nvGrpSpPr>
+        <p:cNvPr id="1" name=""/>
+        <p:cNvGrpSpPr/>
+        <p:nvPr/>
+      </p:nvGrpSpPr>
+      <p:grpSpPr>
+        <a:xfrm>
+          <a:off x="0" y="0"/>
+          <a:ext cx="0" cy="0"/>
+          <a:chOff x="0" y="0"/>
+          <a:chExt cx="0" cy="0"/>
+        </a:xfrm>
+      </p:grpSpPr>
+      <p:sp>
+        <p:nvSpPr>
+          <p:cNvPr id="2" name="Slide Image Placeholder 1"/>
+          <p:cNvSpPr>
+            <a:spLocks noGrp="1" noRot="1" noChangeAspect="1"/>
+          </p:cNvSpPr>
+          <p:nvPr>
+            <p:ph type="sldImg"/>
+          </p:nvPr>
+        </p:nvSpPr>
+        <p:spPr/>
+      </p:sp>
+      <p:sp>
+        <p:nvSpPr>
+          <p:cNvPr id="3" name="Notes Placeholder 2"/>
+          <p:cNvSpPr>
+            <a:spLocks noGrp="1"/>
+          </p:cNvSpPr>
+          <p:nvPr>
+            <p:ph type="body" idx="1"/>
+          </p:nvPr>
+        </p:nvSpPr>
+        <p:spPr/>
+        <p:txBody>
+          <a:bodyPr/>
+          <a:lstStyle/>
+          <a:p>
+            <a:pPr marL="0" marR="0" lvl="0" indent="0" algn="l" defTabSz="914400" rtl="0" eaLnBrk="1" fontAlgn="auto" latinLnBrk="0" hangingPunct="1">
+              <a:lnSpc>
+                <a:spcPct val="100000"/>
+              </a:lnSpc>
+              <a:spcBef>
+                <a:spcPts val="0"/>
+              </a:spcBef>
+              <a:spcAft>
+                <a:spcPts val="0"/>
+              </a:spcAft>
+              <a:buClrTx/>
+              <a:buSzTx/>
+              <a:buFontTx/>
+              <a:buNone/>
+              <a:tabLst/>
+              <a:defRPr/>
+            </a:pPr>
+            <a:r>
+              <a:rPr lang="en-US" b="0" dirty="0"/>
+              <a:t>Let take a look at the first link,</a:t>
+            </a:r>
+          </a:p>
+          <a:p>
+            <a:pPr marL="0" marR="0" lvl="0" indent="0" algn="l" defTabSz="914400" rtl="0" eaLnBrk="1" fontAlgn="auto" latinLnBrk="0" hangingPunct="1">
+              <a:lnSpc>
+                <a:spcPct val="100000"/>
+              </a:lnSpc>
+              <a:spcBef>
+                <a:spcPts val="0"/>
+              </a:spcBef>
+              <a:spcAft>
+                <a:spcPts val="0"/>
+              </a:spcAft>
+              <a:buClrTx/>
+              <a:buSzTx/>
+              <a:buFontTx/>
+              <a:buNone/>
+              <a:tabLst/>
+              <a:defRPr/>
+            </a:pPr>
+            <a:r>
+              <a:rPr lang="en-US" b="0" dirty="0"/>
+              <a:t>This is how web worked in the past, every link open a request to the server and we receive a new html file and render it.</a:t>
+            </a:r>
+          </a:p>
+          <a:p>
+            <a:pPr marL="0" marR="0" lvl="0" indent="0" algn="l" defTabSz="914400" rtl="0" eaLnBrk="1" fontAlgn="auto" latinLnBrk="0" hangingPunct="1">
+              <a:lnSpc>
+                <a:spcPct val="100000"/>
+              </a:lnSpc>
+              <a:spcBef>
+                <a:spcPts val="0"/>
+              </a:spcBef>
+              <a:spcAft>
+                <a:spcPts val="0"/>
+              </a:spcAft>
+              <a:buClrTx/>
+              <a:buSzTx/>
+              <a:buFontTx/>
+              <a:buNone/>
+              <a:tabLst/>
+              <a:defRPr/>
+            </a:pPr>
+            <a:r>
+              <a:rPr lang="en-US" b="0" dirty="0"/>
+              <a:t>In that time browsers was weak so all the work was done in the server.</a:t>
+            </a:r>
+          </a:p>
+          <a:p>
+            <a:pPr marL="0" marR="0" lvl="0" indent="0" algn="l" defTabSz="914400" rtl="0" eaLnBrk="1" fontAlgn="auto" latinLnBrk="0" hangingPunct="1">
+              <a:lnSpc>
+                <a:spcPct val="100000"/>
+              </a:lnSpc>
+              <a:spcBef>
+                <a:spcPts val="0"/>
+              </a:spcBef>
+              <a:spcAft>
+                <a:spcPts val="0"/>
+              </a:spcAft>
+              <a:buClrTx/>
+              <a:buSzTx/>
+              <a:buFontTx/>
+              <a:buNone/>
+              <a:tabLst/>
+              <a:defRPr/>
+            </a:pPr>
+            <a:endParaRPr lang="en-US" b="0" dirty="0"/>
+          </a:p>
+          <a:p>
+            <a:pPr marL="0" marR="0" lvl="0" indent="0" algn="l" defTabSz="914400" rtl="0" eaLnBrk="1" fontAlgn="auto" latinLnBrk="0" hangingPunct="1">
+              <a:lnSpc>
+                <a:spcPct val="100000"/>
+              </a:lnSpc>
+              <a:spcBef>
+                <a:spcPts val="0"/>
+              </a:spcBef>
+              <a:spcAft>
+                <a:spcPts val="0"/>
+              </a:spcAft>
+              <a:buClrTx/>
+              <a:buSzTx/>
+              <a:buFontTx/>
+              <a:buNone/>
+              <a:tabLst/>
+              <a:defRPr/>
+            </a:pPr>
+            <a:r>
+              <a:rPr lang="en-US" b="0" dirty="0"/>
+              <a:t>With JS, Browsers &amp; network evolution we change the approach and instead to return to the user a new html file we will return only data and the browser will read it and make manipulation on the existing page with this data.</a:t>
+            </a:r>
+          </a:p>
+          <a:p>
+            <a:pPr marL="0" marR="0" lvl="0" indent="0" algn="l" defTabSz="914400" rtl="0" eaLnBrk="1" fontAlgn="auto" latinLnBrk="0" hangingPunct="1">
+              <a:lnSpc>
+                <a:spcPct val="100000"/>
+              </a:lnSpc>
+              <a:spcBef>
+                <a:spcPts val="0"/>
+              </a:spcBef>
+              <a:spcAft>
+                <a:spcPts val="0"/>
+              </a:spcAft>
+              <a:buClrTx/>
+              <a:buSzTx/>
+              <a:buFontTx/>
+              <a:buNone/>
+              <a:tabLst/>
+              <a:defRPr/>
+            </a:pPr>
+            <a:r>
+              <a:rPr lang="en-US" b="0" dirty="0"/>
+              <a:t>With this evaluation we reduce the logic that need to be done in the server, it will not create a html files any more for dynamic data/use case.</a:t>
+            </a:r>
+          </a:p>
+          <a:p>
+            <a:pPr marL="0" marR="0" lvl="0" indent="0" algn="l" defTabSz="914400" rtl="0" eaLnBrk="1" fontAlgn="auto" latinLnBrk="0" hangingPunct="1">
+              <a:lnSpc>
+                <a:spcPct val="100000"/>
+              </a:lnSpc>
+              <a:spcBef>
+                <a:spcPts val="0"/>
+              </a:spcBef>
+              <a:spcAft>
+                <a:spcPts val="0"/>
+              </a:spcAft>
+              <a:buClrTx/>
+              <a:buSzTx/>
+              <a:buFontTx/>
+              <a:buNone/>
+              <a:tabLst/>
+              <a:defRPr/>
+            </a:pPr>
+            <a:endParaRPr lang="en-US" sz="1200" b="0" i="0" kern="1200" dirty="0">
+              <a:solidFill>
+                <a:schemeClr val="tx1"/>
+              </a:solidFill>
+              <a:effectLst/>
+              <a:latin typeface="+mn-lt"/>
+              <a:ea typeface="+mn-ea"/>
+              <a:cs typeface="+mn-cs"/>
+            </a:endParaRPr>
+          </a:p>
+          <a:p>
+            <a:pPr marL="0" marR="0" lvl="0" indent="0" algn="l" defTabSz="914400" rtl="0" eaLnBrk="1" fontAlgn="auto" latinLnBrk="0" hangingPunct="1">
+              <a:lnSpc>
+                <a:spcPct val="100000"/>
+              </a:lnSpc>
+              <a:spcBef>
+                <a:spcPts val="0"/>
+              </a:spcBef>
+              <a:spcAft>
+                <a:spcPts val="0"/>
+              </a:spcAft>
+              <a:buClrTx/>
+              <a:buSzTx/>
+              <a:buFontTx/>
+              <a:buNone/>
+              <a:tabLst/>
+              <a:defRPr/>
+            </a:pPr>
+            <a:r>
+              <a:rPr lang="en-US" sz="1200" b="0" i="0" kern="1200" dirty="0">
+                <a:solidFill>
+                  <a:schemeClr val="tx1"/>
+                </a:solidFill>
+                <a:effectLst/>
+                <a:latin typeface="+mn-lt"/>
+                <a:ea typeface="+mn-ea"/>
+                <a:cs typeface="+mn-cs"/>
+              </a:rPr>
+              <a:t>What is web Application:</a:t>
+            </a:r>
+          </a:p>
+          <a:p>
+            <a:pPr marL="0" marR="0" lvl="0" indent="0" algn="l" defTabSz="914400" rtl="0" eaLnBrk="1" fontAlgn="auto" latinLnBrk="0" hangingPunct="1">
+              <a:lnSpc>
+                <a:spcPct val="100000"/>
+              </a:lnSpc>
+              <a:spcBef>
+                <a:spcPts val="0"/>
+              </a:spcBef>
+              <a:spcAft>
+                <a:spcPts val="0"/>
+              </a:spcAft>
+              <a:buClrTx/>
+              <a:buSzTx/>
+              <a:buFontTx/>
+              <a:buNone/>
+              <a:tabLst/>
+              <a:defRPr/>
+            </a:pPr>
+            <a:r>
+              <a:rPr lang="en-US" sz="1200" b="0" i="0" kern="1200" dirty="0">
+                <a:solidFill>
+                  <a:schemeClr val="tx1"/>
+                </a:solidFill>
+                <a:effectLst/>
+                <a:latin typeface="+mn-lt"/>
+                <a:ea typeface="+mn-ea"/>
+                <a:cs typeface="+mn-cs"/>
+              </a:rPr>
+              <a:t>It’s easier to make a mobile application because the developer can reuse the same backend code for web application and native mobile application.</a:t>
+            </a:r>
+          </a:p>
+          <a:p>
+            <a:pPr lvl="2" algn="l" rtl="0"/>
+            <a:r>
+              <a:rPr lang="en-US" dirty="0"/>
+              <a:t>Rich/interactive user interface – we have more ways to interact with the page, navigations, click events etc. in the past we have only links and no complex interaction with the user.</a:t>
+            </a:r>
+          </a:p>
+          <a:p>
+            <a:pPr lvl="2" algn="l" rtl="0"/>
+            <a:r>
+              <a:rPr lang="en-US" dirty="0"/>
+              <a:t>Action-oriented rather than information oriented. – when we are entering to web application it’s not to read information any more like we did in the past now we are entering for buying/ordering staff, online editors like photoshop, cloud for backup and doing actions like in the bank etc.</a:t>
+            </a:r>
+          </a:p>
+          <a:p>
+            <a:pPr lvl="2" algn="l" rtl="0"/>
+            <a:r>
+              <a:rPr lang="en-US" dirty="0"/>
+              <a:t>Creation versus Consumption – entering for creating something and not just for consumption (like reading article) </a:t>
+            </a:r>
+          </a:p>
+          <a:p>
+            <a:pPr lvl="2" algn="l" rtl="0"/>
+            <a:r>
+              <a:rPr lang="en-US" dirty="0"/>
+              <a:t>Not relying heavily on (or hiding when possible) the browser chrome (back button, reload button, address bar) – UI don’t need to deepened on browser UI (the upper bar for back and forward,, reload etc.)</a:t>
+            </a:r>
+            <a:endParaRPr lang="en-US" b="0" dirty="0"/>
+          </a:p>
+          <a:p>
+            <a:pPr marL="0" marR="0" lvl="0" indent="0" algn="l" defTabSz="914400" rtl="0" eaLnBrk="1" fontAlgn="auto" latinLnBrk="0" hangingPunct="1">
+              <a:lnSpc>
+                <a:spcPct val="100000"/>
+              </a:lnSpc>
+              <a:spcBef>
+                <a:spcPts val="0"/>
+              </a:spcBef>
+              <a:spcAft>
+                <a:spcPts val="0"/>
+              </a:spcAft>
+              <a:buClrTx/>
+              <a:buSzTx/>
+              <a:buFontTx/>
+              <a:buNone/>
+              <a:tabLst/>
+              <a:defRPr/>
+            </a:pPr>
+            <a:endParaRPr lang="en-US" b="0" dirty="0"/>
+          </a:p>
+          <a:p>
+            <a:pPr marL="0" marR="0" lvl="0" indent="0" algn="l" defTabSz="914400" rtl="0" eaLnBrk="1" fontAlgn="auto" latinLnBrk="0" hangingPunct="1">
+              <a:lnSpc>
+                <a:spcPct val="100000"/>
+              </a:lnSpc>
+              <a:spcBef>
+                <a:spcPts val="0"/>
+              </a:spcBef>
+              <a:spcAft>
+                <a:spcPts val="0"/>
+              </a:spcAft>
+              <a:buClrTx/>
+              <a:buSzTx/>
+              <a:buFontTx/>
+              <a:buNone/>
+              <a:tabLst/>
+              <a:defRPr/>
+            </a:pPr>
+            <a:endParaRPr lang="en-US" b="0" dirty="0"/>
+          </a:p>
+          <a:p>
+            <a:pPr marL="0" marR="0" lvl="0" indent="0" algn="l" defTabSz="914400" rtl="0" eaLnBrk="1" fontAlgn="auto" latinLnBrk="0" hangingPunct="1">
+              <a:lnSpc>
+                <a:spcPct val="100000"/>
+              </a:lnSpc>
+              <a:spcBef>
+                <a:spcPts val="0"/>
+              </a:spcBef>
+              <a:spcAft>
+                <a:spcPts val="0"/>
+              </a:spcAft>
+              <a:buClrTx/>
+              <a:buSzTx/>
+              <a:buFontTx/>
+              <a:buNone/>
+              <a:tabLst/>
+              <a:defRPr/>
+            </a:pPr>
+            <a:r>
+              <a:rPr lang="en-US" b="0" dirty="0"/>
+              <a:t>Why single page application?</a:t>
+            </a:r>
+          </a:p>
+          <a:p>
+            <a:pPr marL="0" marR="0" lvl="0" indent="0" algn="l" defTabSz="914400" rtl="0" eaLnBrk="1" fontAlgn="auto" latinLnBrk="0" hangingPunct="1">
+              <a:lnSpc>
+                <a:spcPct val="100000"/>
+              </a:lnSpc>
+              <a:spcBef>
+                <a:spcPts val="0"/>
+              </a:spcBef>
+              <a:spcAft>
+                <a:spcPts val="0"/>
+              </a:spcAft>
+              <a:buClrTx/>
+              <a:buSzTx/>
+              <a:buFontTx/>
+              <a:buNone/>
+              <a:tabLst/>
+              <a:defRPr/>
+            </a:pPr>
+            <a:r>
+              <a:rPr lang="en-US" b="0" dirty="0"/>
+              <a:t>Cheap – we don’t need to buy any license, the browser is free.</a:t>
+            </a:r>
+          </a:p>
+          <a:p>
+            <a:pPr marL="0" marR="0" lvl="0" indent="0" algn="l" defTabSz="914400" rtl="0" eaLnBrk="1" fontAlgn="auto" latinLnBrk="0" hangingPunct="1">
+              <a:lnSpc>
+                <a:spcPct val="100000"/>
+              </a:lnSpc>
+              <a:spcBef>
+                <a:spcPts val="0"/>
+              </a:spcBef>
+              <a:spcAft>
+                <a:spcPts val="0"/>
+              </a:spcAft>
+              <a:buClrTx/>
+              <a:buSzTx/>
+              <a:buFontTx/>
+              <a:buNone/>
+              <a:tabLst/>
+              <a:defRPr/>
+            </a:pPr>
+            <a:r>
+              <a:rPr lang="en-US" b="0" dirty="0"/>
+              <a:t>Accessible from any page at any computer</a:t>
+            </a:r>
+          </a:p>
+          <a:p>
+            <a:pPr lvl="2" algn="l" rtl="0"/>
+            <a:r>
+              <a:rPr lang="en-US" dirty="0"/>
+              <a:t>Ease of development</a:t>
+            </a:r>
+          </a:p>
+          <a:p>
+            <a:pPr lvl="2" algn="l" rtl="0"/>
+            <a:r>
+              <a:rPr lang="en-US" dirty="0"/>
+              <a:t>Ease of Maintenance </a:t>
+            </a:r>
+          </a:p>
+          <a:p>
+            <a:pPr lvl="2" algn="l" rtl="0"/>
+            <a:r>
+              <a:rPr lang="en-US" dirty="0"/>
+              <a:t>Cross-platform</a:t>
+            </a:r>
+          </a:p>
+          <a:p>
+            <a:pPr lvl="2" algn="l" rtl="0"/>
+            <a:r>
+              <a:rPr lang="en-US" dirty="0"/>
+              <a:t>Mobility</a:t>
+            </a:r>
+          </a:p>
+          <a:p>
+            <a:pPr lvl="2" algn="l" rtl="0"/>
+            <a:r>
+              <a:rPr lang="en-US" dirty="0"/>
+              <a:t>No need for “Market Place”</a:t>
+            </a:r>
+            <a:endParaRPr lang="en-US" b="0" dirty="0"/>
+          </a:p>
+          <a:p>
+            <a:pPr marL="0" marR="0" lvl="0" indent="0" algn="l" defTabSz="914400" rtl="0" eaLnBrk="1" fontAlgn="auto" latinLnBrk="0" hangingPunct="1">
+              <a:lnSpc>
+                <a:spcPct val="100000"/>
+              </a:lnSpc>
+              <a:spcBef>
+                <a:spcPts val="0"/>
+              </a:spcBef>
+              <a:spcAft>
+                <a:spcPts val="0"/>
+              </a:spcAft>
+              <a:buClrTx/>
+              <a:buSzTx/>
+              <a:buFontTx/>
+              <a:buNone/>
+              <a:tabLst/>
+              <a:defRPr/>
+            </a:pPr>
+            <a:endParaRPr lang="en-US" b="0" dirty="0"/>
+          </a:p>
+          <a:p>
+            <a:pPr marL="0" marR="0" lvl="0" indent="0" algn="l" defTabSz="914400" rtl="0" eaLnBrk="1" fontAlgn="auto" latinLnBrk="0" hangingPunct="1">
+              <a:lnSpc>
+                <a:spcPct val="100000"/>
+              </a:lnSpc>
+              <a:spcBef>
+                <a:spcPts val="0"/>
+              </a:spcBef>
+              <a:spcAft>
+                <a:spcPts val="0"/>
+              </a:spcAft>
+              <a:buClrTx/>
+              <a:buSzTx/>
+              <a:buFontTx/>
+              <a:buNone/>
+              <a:tabLst/>
+              <a:defRPr/>
+            </a:pPr>
+            <a:endParaRPr lang="en-US" b="0" dirty="0"/>
+          </a:p>
+          <a:p>
+            <a:pPr marL="0" marR="0" lvl="0" indent="0" algn="l" defTabSz="914400" rtl="0" eaLnBrk="1" fontAlgn="auto" latinLnBrk="0" hangingPunct="1">
+              <a:lnSpc>
+                <a:spcPct val="100000"/>
+              </a:lnSpc>
+              <a:spcBef>
+                <a:spcPts val="0"/>
+              </a:spcBef>
+              <a:spcAft>
+                <a:spcPts val="0"/>
+              </a:spcAft>
+              <a:buClrTx/>
+              <a:buSzTx/>
+              <a:buFontTx/>
+              <a:buNone/>
+              <a:tabLst/>
+              <a:defRPr/>
+            </a:pPr>
+            <a:endParaRPr lang="en-US" b="0" dirty="0"/>
+          </a:p>
+          <a:p>
+            <a:pPr marL="171450" marR="0" lvl="0" indent="-171450" algn="l" defTabSz="914400" rtl="0" eaLnBrk="1" fontAlgn="auto" latinLnBrk="0" hangingPunct="1">
+              <a:lnSpc>
+                <a:spcPct val="100000"/>
+              </a:lnSpc>
+              <a:spcBef>
+                <a:spcPts val="0"/>
+              </a:spcBef>
+              <a:spcAft>
+                <a:spcPts val="0"/>
+              </a:spcAft>
+              <a:buClrTx/>
+              <a:buSzTx/>
+              <a:buFontTx/>
+              <a:buChar char="-"/>
+              <a:tabLst/>
+              <a:defRPr/>
+            </a:pPr>
+            <a:r>
+              <a:rPr lang="en-US" dirty="0">
+                <a:hlinkClick r:id="rId3"/>
+              </a:rPr>
+              <a:t>https://medium.com/@NeotericEU/single-page-application-vs-multiple-page-application-2591588efe58</a:t>
+            </a:r>
+            <a:endParaRPr lang="en-US" b="0" dirty="0"/>
+          </a:p>
+          <a:p>
+            <a:pPr marL="0" marR="0" lvl="0" indent="0" algn="l" defTabSz="914400" rtl="0" eaLnBrk="1" fontAlgn="auto" latinLnBrk="0" hangingPunct="1">
+              <a:lnSpc>
+                <a:spcPct val="100000"/>
+              </a:lnSpc>
+              <a:spcBef>
+                <a:spcPts val="0"/>
+              </a:spcBef>
+              <a:spcAft>
+                <a:spcPts val="0"/>
+              </a:spcAft>
+              <a:buClrTx/>
+              <a:buSzTx/>
+              <a:buFontTx/>
+              <a:buNone/>
+              <a:tabLst/>
+              <a:defRPr/>
+            </a:pPr>
+            <a:endParaRPr lang="en-US" b="0" dirty="0"/>
+          </a:p>
+        </p:txBody>
+      </p:sp>
+      <p:sp>
+        <p:nvSpPr>
+          <p:cNvPr id="4" name="Slide Number Placeholder 3"/>
+          <p:cNvSpPr>
+            <a:spLocks noGrp="1"/>
+          </p:cNvSpPr>
+          <p:nvPr>
+            <p:ph type="sldNum" sz="quarter" idx="10"/>
+          </p:nvPr>
+        </p:nvSpPr>
+        <p:spPr/>
+        <p:txBody>
+          <a:bodyPr/>
+          <a:lstStyle/>
+          <a:p>
+            <a:fld id="{595D0871-5AD0-4670-BDA8-FBE649F625DD}" type="slidenum">
+              <a:rPr lang="he-IL" smtClean="0"/>
+              <a:t>3</a:t>
+            </a:fld>
+            <a:endParaRPr lang="he-IL"/>
+          </a:p>
+        </p:txBody>
+      </p:sp>
+    </p:spTree>
+    <p:extLst>
+      <p:ext uri="{BB962C8B-B14F-4D97-AF65-F5344CB8AC3E}">
+        <p14:creationId xmlns:p14="http://schemas.microsoft.com/office/powerpoint/2010/main" val="3189096051"/>
+      </p:ext>
+    </p:extLst>
+  </p:cSld>
+  <p:clrMapOvr>
+    <a:masterClrMapping/>
+  </p:clrMapOvr>
+</p:notes>
+</file>
+
+<file path=ppt/notesSlides/notesSlide4.xml><?xml version="1.0" encoding="utf-8"?>
+<p:notes xmlns:a="http://schemas.openxmlformats.org/drawingml/2006/main" xmlns:r="http://schemas.openxmlformats.org/officeDocument/2006/relationships" xmlns:p="http://schemas.openxmlformats.org/presentationml/2006/main">
+  <p:cSld>
+    <p:spTree>
+      <p:nvGrpSpPr>
+        <p:cNvPr id="1" name=""/>
+        <p:cNvGrpSpPr/>
+        <p:nvPr/>
+      </p:nvGrpSpPr>
+      <p:grpSpPr>
+        <a:xfrm>
+          <a:off x="0" y="0"/>
+          <a:ext cx="0" cy="0"/>
+          <a:chOff x="0" y="0"/>
+          <a:chExt cx="0" cy="0"/>
+        </a:xfrm>
+      </p:grpSpPr>
+      <p:sp>
+        <p:nvSpPr>
+          <p:cNvPr id="2" name="Slide Image Placeholder 1"/>
+          <p:cNvSpPr>
+            <a:spLocks noGrp="1" noRot="1" noChangeAspect="1"/>
+          </p:cNvSpPr>
+          <p:nvPr>
+            <p:ph type="sldImg"/>
+          </p:nvPr>
+        </p:nvSpPr>
+        <p:spPr/>
+      </p:sp>
+      <p:sp>
+        <p:nvSpPr>
+          <p:cNvPr id="3" name="Notes Placeholder 2"/>
+          <p:cNvSpPr>
+            <a:spLocks noGrp="1"/>
+          </p:cNvSpPr>
+          <p:nvPr>
+            <p:ph type="body" idx="1"/>
+          </p:nvPr>
+        </p:nvSpPr>
+        <p:spPr/>
+        <p:txBody>
+          <a:bodyPr/>
+          <a:lstStyle/>
+          <a:p>
+            <a:pPr marL="0" marR="0" lvl="0" indent="0" algn="l" defTabSz="914400" rtl="0" eaLnBrk="1" fontAlgn="auto" latinLnBrk="0" hangingPunct="1">
+              <a:lnSpc>
+                <a:spcPct val="100000"/>
+              </a:lnSpc>
+              <a:spcBef>
+                <a:spcPts val="0"/>
+              </a:spcBef>
+              <a:spcAft>
+                <a:spcPts val="0"/>
+              </a:spcAft>
+              <a:buClrTx/>
+              <a:buSzTx/>
+              <a:buFontTx/>
+              <a:buNone/>
+              <a:tabLst/>
+              <a:defRPr/>
+            </a:pPr>
+            <a:r>
+              <a:rPr lang="en-US" b="0" dirty="0"/>
+              <a:t>All HTML elements can be considered as boxes. In CSS, the term "box model" is used when talking about design and layout.</a:t>
+            </a:r>
+          </a:p>
+          <a:p>
+            <a:pPr marL="0" marR="0" lvl="0" indent="0" algn="l" defTabSz="914400" rtl="0" eaLnBrk="1" fontAlgn="auto" latinLnBrk="0" hangingPunct="1">
+              <a:lnSpc>
+                <a:spcPct val="100000"/>
+              </a:lnSpc>
+              <a:spcBef>
+                <a:spcPts val="0"/>
+              </a:spcBef>
+              <a:spcAft>
+                <a:spcPts val="0"/>
+              </a:spcAft>
+              <a:buClrTx/>
+              <a:buSzTx/>
+              <a:buFontTx/>
+              <a:buNone/>
+              <a:tabLst/>
+              <a:defRPr/>
+            </a:pPr>
+            <a:r>
+              <a:rPr lang="en-US" b="0" dirty="0"/>
+              <a:t>The CSS box model is essentially a box that wraps around every HTML element. It consists of: margins, borders, padding, and the actual content. The image below illustrates the box model:</a:t>
+            </a:r>
+          </a:p>
+          <a:p>
+            <a:pPr marL="0" marR="0" lvl="0" indent="0" algn="l" defTabSz="914400" rtl="0" eaLnBrk="1" fontAlgn="auto" latinLnBrk="0" hangingPunct="1">
+              <a:lnSpc>
+                <a:spcPct val="100000"/>
+              </a:lnSpc>
+              <a:spcBef>
+                <a:spcPts val="0"/>
+              </a:spcBef>
+              <a:spcAft>
+                <a:spcPts val="0"/>
+              </a:spcAft>
+              <a:buClrTx/>
+              <a:buSzTx/>
+              <a:buFontTx/>
+              <a:buNone/>
+              <a:tabLst/>
+              <a:defRPr/>
+            </a:pPr>
+            <a:endParaRPr lang="en-US" b="0" dirty="0"/>
+          </a:p>
+          <a:p>
+            <a:pPr marL="171450" marR="0" lvl="0" indent="-171450" algn="l" defTabSz="914400" rtl="0" eaLnBrk="1" fontAlgn="auto" latinLnBrk="0" hangingPunct="1">
+              <a:lnSpc>
+                <a:spcPct val="100000"/>
+              </a:lnSpc>
+              <a:spcBef>
+                <a:spcPts val="0"/>
+              </a:spcBef>
+              <a:spcAft>
+                <a:spcPts val="0"/>
+              </a:spcAft>
+              <a:buClrTx/>
+              <a:buSzTx/>
+              <a:buFontTx/>
+              <a:buChar char="-"/>
+              <a:tabLst/>
+              <a:defRPr/>
+            </a:pPr>
+            <a:r>
+              <a:rPr lang="en-US" b="0" dirty="0"/>
+              <a:t>Content - The content of the box, where text and images appear</a:t>
+            </a:r>
+          </a:p>
+          <a:p>
+            <a:pPr marL="171450" marR="0" lvl="0" indent="-171450" algn="l" defTabSz="914400" rtl="0" eaLnBrk="1" fontAlgn="auto" latinLnBrk="0" hangingPunct="1">
+              <a:lnSpc>
+                <a:spcPct val="100000"/>
+              </a:lnSpc>
+              <a:spcBef>
+                <a:spcPts val="0"/>
+              </a:spcBef>
+              <a:spcAft>
+                <a:spcPts val="0"/>
+              </a:spcAft>
+              <a:buClrTx/>
+              <a:buSzTx/>
+              <a:buFontTx/>
+              <a:buChar char="-"/>
+              <a:tabLst/>
+              <a:defRPr/>
+            </a:pPr>
+            <a:r>
+              <a:rPr lang="en-US" b="0" dirty="0"/>
+              <a:t>Padding - Clears an area around the content. The padding is transparent</a:t>
+            </a:r>
+          </a:p>
+          <a:p>
+            <a:pPr marL="171450" marR="0" lvl="0" indent="-171450" algn="l" defTabSz="914400" rtl="0" eaLnBrk="1" fontAlgn="auto" latinLnBrk="0" hangingPunct="1">
+              <a:lnSpc>
+                <a:spcPct val="100000"/>
+              </a:lnSpc>
+              <a:spcBef>
+                <a:spcPts val="0"/>
+              </a:spcBef>
+              <a:spcAft>
+                <a:spcPts val="0"/>
+              </a:spcAft>
+              <a:buClrTx/>
+              <a:buSzTx/>
+              <a:buFontTx/>
+              <a:buChar char="-"/>
+              <a:tabLst/>
+              <a:defRPr/>
+            </a:pPr>
+            <a:r>
+              <a:rPr lang="en-US" b="0" dirty="0"/>
+              <a:t>Border - A border that goes around the padding and content</a:t>
+            </a:r>
+          </a:p>
+          <a:p>
+            <a:pPr marL="171450" marR="0" lvl="0" indent="-171450" algn="l" defTabSz="914400" rtl="0" eaLnBrk="1" fontAlgn="auto" latinLnBrk="0" hangingPunct="1">
+              <a:lnSpc>
+                <a:spcPct val="100000"/>
+              </a:lnSpc>
+              <a:spcBef>
+                <a:spcPts val="0"/>
+              </a:spcBef>
+              <a:spcAft>
+                <a:spcPts val="0"/>
+              </a:spcAft>
+              <a:buClrTx/>
+              <a:buSzTx/>
+              <a:buFontTx/>
+              <a:buChar char="-"/>
+              <a:tabLst/>
+              <a:defRPr/>
+            </a:pPr>
+            <a:r>
+              <a:rPr lang="en-US" b="0" dirty="0"/>
+              <a:t>Margin - Clears an area outside the border. The margin is transparent</a:t>
+            </a:r>
+          </a:p>
+          <a:p>
+            <a:pPr marL="0" marR="0" lvl="0" indent="0" algn="l" defTabSz="914400" rtl="0" eaLnBrk="1" fontAlgn="auto" latinLnBrk="0" hangingPunct="1">
+              <a:lnSpc>
+                <a:spcPct val="100000"/>
+              </a:lnSpc>
+              <a:spcBef>
+                <a:spcPts val="0"/>
+              </a:spcBef>
+              <a:spcAft>
+                <a:spcPts val="0"/>
+              </a:spcAft>
+              <a:buClrTx/>
+              <a:buSzTx/>
+              <a:buFontTx/>
+              <a:buNone/>
+              <a:tabLst/>
+              <a:defRPr/>
+            </a:pPr>
+            <a:endParaRPr lang="en-US" b="0" dirty="0"/>
+          </a:p>
+          <a:p>
+            <a:pPr marL="0" marR="0" lvl="0" indent="0" algn="l" defTabSz="914400" rtl="0" eaLnBrk="1" fontAlgn="auto" latinLnBrk="0" hangingPunct="1">
+              <a:lnSpc>
+                <a:spcPct val="100000"/>
+              </a:lnSpc>
+              <a:spcBef>
+                <a:spcPts val="0"/>
+              </a:spcBef>
+              <a:spcAft>
+                <a:spcPts val="0"/>
+              </a:spcAft>
+              <a:buClrTx/>
+              <a:buSzTx/>
+              <a:buFontTx/>
+              <a:buNone/>
+              <a:tabLst/>
+              <a:defRPr/>
+            </a:pPr>
+            <a:endParaRPr lang="en-US" b="0" dirty="0"/>
+          </a:p>
+          <a:p>
+            <a:pPr marL="0" marR="0" lvl="0" indent="0" algn="l" defTabSz="914400" rtl="0" eaLnBrk="1" fontAlgn="auto" latinLnBrk="0" hangingPunct="1">
+              <a:lnSpc>
+                <a:spcPct val="100000"/>
+              </a:lnSpc>
+              <a:spcBef>
+                <a:spcPts val="0"/>
+              </a:spcBef>
+              <a:spcAft>
+                <a:spcPts val="0"/>
+              </a:spcAft>
+              <a:buClrTx/>
+              <a:buSzTx/>
+              <a:buFontTx/>
+              <a:buNone/>
+              <a:tabLst/>
+              <a:defRPr/>
+            </a:pPr>
+            <a:r>
+              <a:rPr lang="en-US" b="0" dirty="0"/>
+              <a:t>The "Old" border-box Reset</a:t>
+            </a:r>
+          </a:p>
+          <a:p>
+            <a:pPr marL="0" marR="0" lvl="0" indent="0" algn="l" defTabSz="914400" rtl="0" eaLnBrk="1" fontAlgn="auto" latinLnBrk="0" hangingPunct="1">
+              <a:lnSpc>
+                <a:spcPct val="100000"/>
+              </a:lnSpc>
+              <a:spcBef>
+                <a:spcPts val="0"/>
+              </a:spcBef>
+              <a:spcAft>
+                <a:spcPts val="0"/>
+              </a:spcAft>
+              <a:buClrTx/>
+              <a:buSzTx/>
+              <a:buFontTx/>
+              <a:buNone/>
+              <a:tabLst/>
+              <a:defRPr/>
+            </a:pPr>
+            <a:r>
+              <a:rPr lang="en-US" b="0" dirty="0"/>
+              <a:t>The earliest box-sizing: border-box; reset looked like this:</a:t>
+            </a:r>
+          </a:p>
+          <a:p>
+            <a:pPr marL="0" marR="0" lvl="0" indent="0" algn="l" defTabSz="914400" rtl="0" eaLnBrk="1" fontAlgn="auto" latinLnBrk="0" hangingPunct="1">
+              <a:lnSpc>
+                <a:spcPct val="100000"/>
+              </a:lnSpc>
+              <a:spcBef>
+                <a:spcPts val="0"/>
+              </a:spcBef>
+              <a:spcAft>
+                <a:spcPts val="0"/>
+              </a:spcAft>
+              <a:buClrTx/>
+              <a:buSzTx/>
+              <a:buFont typeface="Arial" panose="020B0604020202020204" pitchFamily="34" charset="0"/>
+              <a:buNone/>
+              <a:tabLst/>
+              <a:defRPr/>
+            </a:pPr>
+            <a:r>
+              <a:rPr lang="en-US" b="0" dirty="0"/>
+              <a:t>*{  box-sizing: border-box;}</a:t>
+            </a:r>
+          </a:p>
+          <a:p>
+            <a:pPr marL="0" marR="0" lvl="0" indent="0" algn="l" defTabSz="914400" rtl="0" eaLnBrk="1" fontAlgn="auto" latinLnBrk="0" hangingPunct="1">
+              <a:lnSpc>
+                <a:spcPct val="100000"/>
+              </a:lnSpc>
+              <a:spcBef>
+                <a:spcPts val="0"/>
+              </a:spcBef>
+              <a:spcAft>
+                <a:spcPts val="0"/>
+              </a:spcAft>
+              <a:buClrTx/>
+              <a:buSzTx/>
+              <a:buFont typeface="Arial" panose="020B0604020202020204" pitchFamily="34" charset="0"/>
+              <a:buNone/>
+              <a:tabLst/>
+              <a:defRPr/>
+            </a:pPr>
+            <a:endParaRPr lang="en-US" b="0" dirty="0"/>
+          </a:p>
+          <a:p>
+            <a:pPr marL="0" marR="0" lvl="0" indent="0" algn="l" defTabSz="914400" rtl="0" eaLnBrk="1" fontAlgn="auto" latinLnBrk="0" hangingPunct="1">
+              <a:lnSpc>
+                <a:spcPct val="100000"/>
+              </a:lnSpc>
+              <a:spcBef>
+                <a:spcPts val="0"/>
+              </a:spcBef>
+              <a:spcAft>
+                <a:spcPts val="0"/>
+              </a:spcAft>
+              <a:buClrTx/>
+              <a:buSzTx/>
+              <a:buFont typeface="Arial" panose="020B0604020202020204" pitchFamily="34" charset="0"/>
+              <a:buNone/>
+              <a:tabLst/>
+              <a:defRPr/>
+            </a:pPr>
+            <a:r>
+              <a:rPr lang="en-US" b="0" dirty="0"/>
+              <a:t>This works fairly well, but it leaves out pseudo elements, which can lead to some unexpected results. A revised reset that covers pseudo elements quickly emerged:</a:t>
+            </a:r>
+          </a:p>
+          <a:p>
+            <a:pPr marL="0" marR="0" lvl="0" indent="0" algn="l" defTabSz="914400" rtl="0" eaLnBrk="1" fontAlgn="auto" latinLnBrk="0" hangingPunct="1">
+              <a:lnSpc>
+                <a:spcPct val="100000"/>
+              </a:lnSpc>
+              <a:spcBef>
+                <a:spcPts val="0"/>
+              </a:spcBef>
+              <a:spcAft>
+                <a:spcPts val="0"/>
+              </a:spcAft>
+              <a:buClrTx/>
+              <a:buSzTx/>
+              <a:buFont typeface="Arial" panose="020B0604020202020204" pitchFamily="34" charset="0"/>
+              <a:buNone/>
+              <a:tabLst/>
+              <a:defRPr/>
+            </a:pPr>
+            <a:r>
+              <a:rPr lang="en-US" b="0" dirty="0"/>
+              <a:t>#Universal Box Sizing</a:t>
+            </a:r>
+          </a:p>
+          <a:p>
+            <a:pPr marL="0" marR="0" lvl="0" indent="0" algn="l" defTabSz="914400" rtl="0" eaLnBrk="1" fontAlgn="auto" latinLnBrk="0" hangingPunct="1">
+              <a:lnSpc>
+                <a:spcPct val="100000"/>
+              </a:lnSpc>
+              <a:spcBef>
+                <a:spcPts val="0"/>
+              </a:spcBef>
+              <a:spcAft>
+                <a:spcPts val="0"/>
+              </a:spcAft>
+              <a:buClrTx/>
+              <a:buSzTx/>
+              <a:buFont typeface="Arial" panose="020B0604020202020204" pitchFamily="34" charset="0"/>
+              <a:buNone/>
+              <a:tabLst/>
+              <a:defRPr/>
+            </a:pPr>
+            <a:r>
+              <a:rPr lang="en-US" b="0" dirty="0"/>
+              <a:t>*, *:before, *:after {  box-sizing: border-box;}</a:t>
+            </a:r>
+          </a:p>
+          <a:p>
+            <a:pPr marL="0" marR="0" lvl="0" indent="0" algn="l" defTabSz="914400" rtl="0" eaLnBrk="1" fontAlgn="auto" latinLnBrk="0" hangingPunct="1">
+              <a:lnSpc>
+                <a:spcPct val="100000"/>
+              </a:lnSpc>
+              <a:spcBef>
+                <a:spcPts val="0"/>
+              </a:spcBef>
+              <a:spcAft>
+                <a:spcPts val="0"/>
+              </a:spcAft>
+              <a:buClrTx/>
+              <a:buSzTx/>
+              <a:buFont typeface="Arial" panose="020B0604020202020204" pitchFamily="34" charset="0"/>
+              <a:buNone/>
+              <a:tabLst/>
+              <a:defRPr/>
+            </a:pPr>
+            <a:endParaRPr lang="en-US" b="0" dirty="0"/>
+          </a:p>
+          <a:p>
+            <a:pPr marL="0" marR="0" lvl="0" indent="0" algn="l" defTabSz="914400" rtl="0" eaLnBrk="1" fontAlgn="auto" latinLnBrk="0" hangingPunct="1">
+              <a:lnSpc>
+                <a:spcPct val="100000"/>
+              </a:lnSpc>
+              <a:spcBef>
+                <a:spcPts val="0"/>
+              </a:spcBef>
+              <a:spcAft>
+                <a:spcPts val="0"/>
+              </a:spcAft>
+              <a:buClrTx/>
+              <a:buSzTx/>
+              <a:buFont typeface="Arial" panose="020B0604020202020204" pitchFamily="34" charset="0"/>
+              <a:buNone/>
+              <a:tabLst/>
+              <a:defRPr/>
+            </a:pPr>
+            <a:r>
+              <a:rPr lang="en-US" b="0" dirty="0"/>
+              <a:t>This method selected pseudo elements as well, improving the normalizing effect of border-box. But, the * selector makes it difficult for developers to use content-box or padding-box elsewhere in the CSS. Which brings us to the current frontrunner for best practice:</a:t>
+            </a:r>
+          </a:p>
+          <a:p>
+            <a:pPr marL="0" marR="0" lvl="0" indent="0" algn="l" defTabSz="914400" rtl="0" eaLnBrk="1" fontAlgn="auto" latinLnBrk="0" hangingPunct="1">
+              <a:lnSpc>
+                <a:spcPct val="100000"/>
+              </a:lnSpc>
+              <a:spcBef>
+                <a:spcPts val="0"/>
+              </a:spcBef>
+              <a:spcAft>
+                <a:spcPts val="0"/>
+              </a:spcAft>
+              <a:buClrTx/>
+              <a:buSzTx/>
+              <a:buFont typeface="Arial" panose="020B0604020202020204" pitchFamily="34" charset="0"/>
+              <a:buNone/>
+              <a:tabLst/>
+              <a:defRPr/>
+            </a:pPr>
+            <a:endParaRPr lang="en-US" b="0" dirty="0"/>
+          </a:p>
+          <a:p>
+            <a:pPr marL="0" marR="0" lvl="0" indent="0" algn="l" defTabSz="914400" rtl="0" eaLnBrk="1" fontAlgn="auto" latinLnBrk="0" hangingPunct="1">
+              <a:lnSpc>
+                <a:spcPct val="100000"/>
+              </a:lnSpc>
+              <a:spcBef>
+                <a:spcPts val="0"/>
+              </a:spcBef>
+              <a:spcAft>
+                <a:spcPts val="0"/>
+              </a:spcAft>
+              <a:buClrTx/>
+              <a:buSzTx/>
+              <a:buFont typeface="Arial" panose="020B0604020202020204" pitchFamily="34" charset="0"/>
+              <a:buNone/>
+              <a:tabLst/>
+              <a:defRPr/>
+            </a:pPr>
+            <a:r>
+              <a:rPr lang="en-US" b="0" dirty="0"/>
+              <a:t>#Universal Box Sizing with Inheritance</a:t>
+            </a:r>
+          </a:p>
+          <a:p>
+            <a:pPr marL="0" marR="0" lvl="0" indent="0" algn="l" defTabSz="914400" rtl="0" eaLnBrk="1" fontAlgn="auto" latinLnBrk="0" hangingPunct="1">
+              <a:lnSpc>
+                <a:spcPct val="100000"/>
+              </a:lnSpc>
+              <a:spcBef>
+                <a:spcPts val="0"/>
+              </a:spcBef>
+              <a:spcAft>
+                <a:spcPts val="0"/>
+              </a:spcAft>
+              <a:buClrTx/>
+              <a:buSzTx/>
+              <a:buFont typeface="Arial" panose="020B0604020202020204" pitchFamily="34" charset="0"/>
+              <a:buNone/>
+              <a:tabLst/>
+              <a:defRPr/>
+            </a:pPr>
+            <a:r>
+              <a:rPr lang="en-US" b="0" dirty="0"/>
+              <a:t>html {  box-sizing: border-box;}</a:t>
+            </a:r>
+          </a:p>
+          <a:p>
+            <a:pPr marL="0" marR="0" lvl="0" indent="0" algn="l" defTabSz="914400" rtl="0" eaLnBrk="1" fontAlgn="auto" latinLnBrk="0" hangingPunct="1">
+              <a:lnSpc>
+                <a:spcPct val="100000"/>
+              </a:lnSpc>
+              <a:spcBef>
+                <a:spcPts val="0"/>
+              </a:spcBef>
+              <a:spcAft>
+                <a:spcPts val="0"/>
+              </a:spcAft>
+              <a:buClrTx/>
+              <a:buSzTx/>
+              <a:buFont typeface="Arial" panose="020B0604020202020204" pitchFamily="34" charset="0"/>
+              <a:buNone/>
+              <a:tabLst/>
+              <a:defRPr/>
+            </a:pPr>
+            <a:r>
+              <a:rPr lang="en-US" b="0" dirty="0"/>
+              <a:t>*, *:before, *:after {  box-sizing: inherit;}</a:t>
+            </a:r>
+          </a:p>
+          <a:p>
+            <a:pPr marL="0" marR="0" lvl="0" indent="0" algn="l" defTabSz="914400" rtl="0" eaLnBrk="1" fontAlgn="auto" latinLnBrk="0" hangingPunct="1">
+              <a:lnSpc>
+                <a:spcPct val="100000"/>
+              </a:lnSpc>
+              <a:spcBef>
+                <a:spcPts val="0"/>
+              </a:spcBef>
+              <a:spcAft>
+                <a:spcPts val="0"/>
+              </a:spcAft>
+              <a:buClrTx/>
+              <a:buSzTx/>
+              <a:buFont typeface="Arial" panose="020B0604020202020204" pitchFamily="34" charset="0"/>
+              <a:buNone/>
+              <a:tabLst/>
+              <a:defRPr/>
+            </a:pPr>
+            <a:endParaRPr lang="en-US" b="0" dirty="0"/>
+          </a:p>
+          <a:p>
+            <a:pPr marL="0" marR="0" lvl="0" indent="0" algn="l" defTabSz="914400" rtl="0" eaLnBrk="1" fontAlgn="auto" latinLnBrk="0" hangingPunct="1">
+              <a:lnSpc>
+                <a:spcPct val="100000"/>
+              </a:lnSpc>
+              <a:spcBef>
+                <a:spcPts val="0"/>
+              </a:spcBef>
+              <a:spcAft>
+                <a:spcPts val="0"/>
+              </a:spcAft>
+              <a:buClrTx/>
+              <a:buSzTx/>
+              <a:buFont typeface="Arial" panose="020B0604020202020204" pitchFamily="34" charset="0"/>
+              <a:buNone/>
+              <a:tabLst/>
+              <a:defRPr/>
+            </a:pPr>
+            <a:r>
+              <a:rPr lang="en-US" b="0" dirty="0"/>
+              <a:t>This reset gives you more flexibility than its predecessors - you can use content-box or padding-box (where supported) at will, without worrying about a universal selector overriding your CSS.</a:t>
+            </a:r>
+          </a:p>
+          <a:p>
+            <a:pPr marL="0" marR="0" lvl="0" indent="0" algn="l" defTabSz="914400" rtl="0" eaLnBrk="1" fontAlgn="auto" latinLnBrk="0" hangingPunct="1">
+              <a:lnSpc>
+                <a:spcPct val="100000"/>
+              </a:lnSpc>
+              <a:spcBef>
+                <a:spcPts val="0"/>
+              </a:spcBef>
+              <a:spcAft>
+                <a:spcPts val="0"/>
+              </a:spcAft>
+              <a:buClrTx/>
+              <a:buSzTx/>
+              <a:buFontTx/>
+              <a:buNone/>
+              <a:tabLst/>
+              <a:defRPr/>
+            </a:pPr>
+            <a:endParaRPr lang="en-US" b="0" dirty="0"/>
+          </a:p>
+          <a:p>
+            <a:pPr marL="0" marR="0" lvl="0" indent="0" algn="l" defTabSz="914400" rtl="0" eaLnBrk="1" fontAlgn="auto" latinLnBrk="0" hangingPunct="1">
+              <a:lnSpc>
+                <a:spcPct val="100000"/>
+              </a:lnSpc>
+              <a:spcBef>
+                <a:spcPts val="0"/>
+              </a:spcBef>
+              <a:spcAft>
+                <a:spcPts val="0"/>
+              </a:spcAft>
+              <a:buClrTx/>
+              <a:buSzTx/>
+              <a:buFontTx/>
+              <a:buNone/>
+              <a:tabLst/>
+              <a:defRPr/>
+            </a:pPr>
+            <a:endParaRPr lang="en-US" b="0" dirty="0"/>
+          </a:p>
+          <a:p>
+            <a:pPr marL="171450" marR="0" lvl="0" indent="-171450" algn="l" defTabSz="914400" rtl="0" eaLnBrk="1" fontAlgn="auto" latinLnBrk="0" hangingPunct="1">
+              <a:lnSpc>
+                <a:spcPct val="100000"/>
+              </a:lnSpc>
+              <a:spcBef>
+                <a:spcPts val="0"/>
+              </a:spcBef>
+              <a:spcAft>
+                <a:spcPts val="0"/>
+              </a:spcAft>
+              <a:buClrTx/>
+              <a:buSzTx/>
+              <a:buFontTx/>
+              <a:buChar char="-"/>
+              <a:tabLst/>
+              <a:defRPr/>
+            </a:pPr>
+            <a:r>
+              <a:rPr lang="en-US" dirty="0">
+                <a:hlinkClick r:id="rId3"/>
+              </a:rPr>
+              <a:t>https://css-tricks.com/box-sizing/</a:t>
+            </a:r>
+            <a:endParaRPr lang="en-US" dirty="0"/>
+          </a:p>
+          <a:p>
+            <a:pPr marL="171450" marR="0" lvl="0" indent="-171450" algn="l" defTabSz="914400" rtl="0" eaLnBrk="1" fontAlgn="auto" latinLnBrk="0" hangingPunct="1">
+              <a:lnSpc>
+                <a:spcPct val="100000"/>
+              </a:lnSpc>
+              <a:spcBef>
+                <a:spcPts val="0"/>
+              </a:spcBef>
+              <a:spcAft>
+                <a:spcPts val="0"/>
+              </a:spcAft>
+              <a:buClrTx/>
+              <a:buSzTx/>
+              <a:buFontTx/>
+              <a:buChar char="-"/>
+              <a:tabLst/>
+              <a:defRPr/>
+            </a:pPr>
+            <a:r>
+              <a:rPr lang="en-US" dirty="0">
+                <a:hlinkClick r:id="rId4"/>
+              </a:rPr>
+              <a:t>https://www.w3schools.com/css/css_boxmodel.asp</a:t>
+            </a:r>
+            <a:endParaRPr lang="en-US" dirty="0"/>
+          </a:p>
+          <a:p>
+            <a:pPr marL="171450" marR="0" lvl="0" indent="-171450" algn="l" defTabSz="914400" rtl="0" eaLnBrk="1" fontAlgn="auto" latinLnBrk="0" hangingPunct="1">
+              <a:lnSpc>
+                <a:spcPct val="100000"/>
+              </a:lnSpc>
+              <a:spcBef>
+                <a:spcPts val="0"/>
+              </a:spcBef>
+              <a:spcAft>
+                <a:spcPts val="0"/>
+              </a:spcAft>
+              <a:buClrTx/>
+              <a:buSzTx/>
+              <a:buFontTx/>
+              <a:buChar char="-"/>
+              <a:tabLst/>
+              <a:defRPr/>
+            </a:pPr>
+            <a:r>
+              <a:rPr lang="en-US" dirty="0">
+                <a:hlinkClick r:id="rId5"/>
+              </a:rPr>
+              <a:t>https://developer.mozilla.org/en-US/docs/Web/CSS/box-sizing</a:t>
+            </a:r>
+            <a:endParaRPr lang="en-US" dirty="0"/>
+          </a:p>
+          <a:p>
+            <a:pPr marL="171450" marR="0" lvl="0" indent="-171450" algn="l" defTabSz="914400" rtl="0" eaLnBrk="1" fontAlgn="auto" latinLnBrk="0" hangingPunct="1">
+              <a:lnSpc>
+                <a:spcPct val="100000"/>
+              </a:lnSpc>
+              <a:spcBef>
+                <a:spcPts val="0"/>
+              </a:spcBef>
+              <a:spcAft>
+                <a:spcPts val="0"/>
+              </a:spcAft>
+              <a:buClrTx/>
+              <a:buSzTx/>
+              <a:buFontTx/>
+              <a:buChar char="-"/>
+              <a:tabLst/>
+              <a:defRPr/>
+            </a:pPr>
+            <a:r>
+              <a:rPr lang="en-US" dirty="0">
+                <a:hlinkClick r:id="rId6"/>
+              </a:rPr>
+              <a:t>https://www.abeautifulsite.net/box-sizing-border-box-explained</a:t>
+            </a:r>
+            <a:endParaRPr lang="en-US" dirty="0"/>
+          </a:p>
+          <a:p>
+            <a:pPr marL="171450" marR="0" lvl="0" indent="-171450" algn="l" defTabSz="914400" rtl="0" eaLnBrk="1" fontAlgn="auto" latinLnBrk="0" hangingPunct="1">
+              <a:lnSpc>
+                <a:spcPct val="100000"/>
+              </a:lnSpc>
+              <a:spcBef>
+                <a:spcPts val="0"/>
+              </a:spcBef>
+              <a:spcAft>
+                <a:spcPts val="0"/>
+              </a:spcAft>
+              <a:buClrTx/>
+              <a:buSzTx/>
+              <a:buFontTx/>
+              <a:buChar char="-"/>
+              <a:tabLst/>
+              <a:defRPr/>
+            </a:pPr>
+            <a:r>
+              <a:rPr lang="en-US" dirty="0">
+                <a:hlinkClick r:id="rId7"/>
+              </a:rPr>
+              <a:t>https://codepen.io/team/css-tricks/pen/970f26f621cfa3ae3eec7e2a6b0e8c97</a:t>
+            </a:r>
+            <a:endParaRPr lang="en-US" dirty="0"/>
+          </a:p>
+          <a:p>
+            <a:pPr marL="171450" marR="0" lvl="0" indent="-171450" algn="l" defTabSz="914400" rtl="0" eaLnBrk="1" fontAlgn="auto" latinLnBrk="0" hangingPunct="1">
+              <a:lnSpc>
+                <a:spcPct val="100000"/>
+              </a:lnSpc>
+              <a:spcBef>
+                <a:spcPts val="0"/>
+              </a:spcBef>
+              <a:spcAft>
+                <a:spcPts val="0"/>
+              </a:spcAft>
+              <a:buClrTx/>
+              <a:buSzTx/>
+              <a:buFontTx/>
+              <a:buChar char="-"/>
+              <a:tabLst/>
+              <a:defRPr/>
+            </a:pPr>
+            <a:endParaRPr lang="en-US" dirty="0"/>
+          </a:p>
+          <a:p>
+            <a:pPr marL="171450" marR="0" lvl="0" indent="-171450" algn="l" defTabSz="914400" rtl="0" eaLnBrk="1" fontAlgn="auto" latinLnBrk="0" hangingPunct="1">
+              <a:lnSpc>
+                <a:spcPct val="100000"/>
+              </a:lnSpc>
+              <a:spcBef>
+                <a:spcPts val="0"/>
+              </a:spcBef>
+              <a:spcAft>
+                <a:spcPts val="0"/>
+              </a:spcAft>
+              <a:buClrTx/>
+              <a:buSzTx/>
+              <a:buFontTx/>
+              <a:buChar char="-"/>
+              <a:tabLst/>
+              <a:defRPr/>
+            </a:pPr>
+            <a:endParaRPr lang="en-US" b="0" dirty="0"/>
+          </a:p>
+        </p:txBody>
+      </p:sp>
+      <p:sp>
+        <p:nvSpPr>
+          <p:cNvPr id="4" name="Slide Number Placeholder 3"/>
+          <p:cNvSpPr>
+            <a:spLocks noGrp="1"/>
+          </p:cNvSpPr>
+          <p:nvPr>
+            <p:ph type="sldNum" sz="quarter" idx="10"/>
+          </p:nvPr>
+        </p:nvSpPr>
+        <p:spPr/>
+        <p:txBody>
+          <a:bodyPr/>
+          <a:lstStyle/>
+          <a:p>
+            <a:fld id="{595D0871-5AD0-4670-BDA8-FBE649F625DD}" type="slidenum">
+              <a:rPr lang="he-IL" smtClean="0"/>
+              <a:t>4</a:t>
+            </a:fld>
+            <a:endParaRPr lang="he-IL"/>
+          </a:p>
+        </p:txBody>
+      </p:sp>
+    </p:spTree>
+    <p:extLst>
+      <p:ext uri="{BB962C8B-B14F-4D97-AF65-F5344CB8AC3E}">
+        <p14:creationId xmlns:p14="http://schemas.microsoft.com/office/powerpoint/2010/main" val="3773399"/>
+      </p:ext>
+    </p:extLst>
+  </p:cSld>
+  <p:clrMapOvr>
+    <a:masterClrMapping/>
+  </p:clrMapOvr>
+</p:notes>
+</file>
+
+<file path=ppt/notesSlides/notesSlide5.xml><?xml version="1.0" encoding="utf-8"?>
+<p:notes xmlns:a="http://schemas.openxmlformats.org/drawingml/2006/main" xmlns:r="http://schemas.openxmlformats.org/officeDocument/2006/relationships" xmlns:p="http://schemas.openxmlformats.org/presentationml/2006/main">
+  <p:cSld>
+    <p:spTree>
+      <p:nvGrpSpPr>
+        <p:cNvPr id="1" name=""/>
+        <p:cNvGrpSpPr/>
+        <p:nvPr/>
+      </p:nvGrpSpPr>
+      <p:grpSpPr>
+        <a:xfrm>
+          <a:off x="0" y="0"/>
+          <a:ext cx="0" cy="0"/>
+          <a:chOff x="0" y="0"/>
+          <a:chExt cx="0" cy="0"/>
+        </a:xfrm>
+      </p:grpSpPr>
+      <p:sp>
+        <p:nvSpPr>
+          <p:cNvPr id="2" name="Slide Image Placeholder 1"/>
+          <p:cNvSpPr>
+            <a:spLocks noGrp="1" noRot="1" noChangeAspect="1"/>
+          </p:cNvSpPr>
+          <p:nvPr>
+            <p:ph type="sldImg"/>
+          </p:nvPr>
+        </p:nvSpPr>
+        <p:spPr/>
+      </p:sp>
+      <p:sp>
+        <p:nvSpPr>
+          <p:cNvPr id="3" name="Notes Placeholder 2"/>
+          <p:cNvSpPr>
+            <a:spLocks noGrp="1"/>
+          </p:cNvSpPr>
+          <p:nvPr>
+            <p:ph type="body" idx="1"/>
+          </p:nvPr>
+        </p:nvSpPr>
+        <p:spPr/>
+        <p:txBody>
+          <a:bodyPr/>
+          <a:lstStyle/>
+          <a:p>
+            <a:pPr marL="0" marR="0" lvl="0" indent="0" algn="l" defTabSz="914400" rtl="0" eaLnBrk="1" fontAlgn="auto" latinLnBrk="0" hangingPunct="1">
+              <a:lnSpc>
+                <a:spcPct val="100000"/>
+              </a:lnSpc>
+              <a:spcBef>
+                <a:spcPts val="0"/>
+              </a:spcBef>
+              <a:spcAft>
+                <a:spcPts val="0"/>
+              </a:spcAft>
+              <a:buClrTx/>
+              <a:buSzTx/>
+              <a:buFontTx/>
+              <a:buNone/>
+              <a:tabLst/>
+              <a:defRPr/>
+            </a:pPr>
+            <a:endParaRPr lang="en-US" b="0" dirty="0"/>
+          </a:p>
+          <a:p>
+            <a:pPr marL="0" marR="0" lvl="0" indent="0" algn="l" defTabSz="914400" rtl="0" eaLnBrk="1" fontAlgn="auto" latinLnBrk="0" hangingPunct="1">
+              <a:lnSpc>
+                <a:spcPct val="100000"/>
+              </a:lnSpc>
+              <a:spcBef>
+                <a:spcPts val="0"/>
+              </a:spcBef>
+              <a:spcAft>
+                <a:spcPts val="0"/>
+              </a:spcAft>
+              <a:buClrTx/>
+              <a:buSzTx/>
+              <a:buFontTx/>
+              <a:buNone/>
+              <a:tabLst/>
+              <a:defRPr/>
+            </a:pPr>
+            <a:endParaRPr lang="en-US" b="0" dirty="0"/>
+          </a:p>
+          <a:p>
+            <a:pPr marL="0" marR="0" lvl="0" indent="0" algn="l" defTabSz="914400" rtl="0" eaLnBrk="1" fontAlgn="auto" latinLnBrk="0" hangingPunct="1">
+              <a:lnSpc>
+                <a:spcPct val="100000"/>
+              </a:lnSpc>
+              <a:spcBef>
+                <a:spcPts val="0"/>
+              </a:spcBef>
+              <a:spcAft>
+                <a:spcPts val="0"/>
+              </a:spcAft>
+              <a:buClrTx/>
+              <a:buSzTx/>
+              <a:buFontTx/>
+              <a:buNone/>
+              <a:tabLst/>
+              <a:defRPr/>
+            </a:pPr>
+            <a:endParaRPr lang="en-US" b="0" dirty="0"/>
+          </a:p>
+          <a:p>
+            <a:pPr marL="171450" marR="0" lvl="0" indent="-171450" algn="l" defTabSz="914400" rtl="0" eaLnBrk="1" fontAlgn="auto" latinLnBrk="0" hangingPunct="1">
+              <a:lnSpc>
+                <a:spcPct val="100000"/>
+              </a:lnSpc>
+              <a:spcBef>
+                <a:spcPts val="0"/>
+              </a:spcBef>
+              <a:spcAft>
+                <a:spcPts val="0"/>
+              </a:spcAft>
+              <a:buClrTx/>
+              <a:buSzTx/>
+              <a:buFontTx/>
+              <a:buChar char="-"/>
+              <a:tabLst/>
+              <a:defRPr/>
+            </a:pPr>
+            <a:r>
+              <a:rPr lang="en-US" dirty="0">
+                <a:hlinkClick r:id="rId3"/>
+              </a:rPr>
+              <a:t>https://www.smashingmagazine.com/2018/01/understanding-sizing-css-layout/</a:t>
+            </a:r>
+            <a:endParaRPr lang="en-US" dirty="0"/>
+          </a:p>
+          <a:p>
+            <a:pPr marL="171450" marR="0" lvl="0" indent="-171450" algn="l" defTabSz="914400" rtl="0" eaLnBrk="1" fontAlgn="auto" latinLnBrk="0" hangingPunct="1">
+              <a:lnSpc>
+                <a:spcPct val="100000"/>
+              </a:lnSpc>
+              <a:spcBef>
+                <a:spcPts val="0"/>
+              </a:spcBef>
+              <a:spcAft>
+                <a:spcPts val="0"/>
+              </a:spcAft>
+              <a:buClrTx/>
+              <a:buSzTx/>
+              <a:buFontTx/>
+              <a:buChar char="-"/>
+              <a:tabLst/>
+              <a:defRPr/>
+            </a:pPr>
+            <a:r>
+              <a:rPr lang="en-US" dirty="0">
+                <a:hlinkClick r:id="rId4"/>
+              </a:rPr>
+              <a:t>https://caniuse.com/#feat=viewport-units</a:t>
+            </a:r>
+            <a:endParaRPr lang="en-US" dirty="0"/>
+          </a:p>
+          <a:p>
+            <a:pPr marL="171450" marR="0" lvl="0" indent="-171450" algn="l" defTabSz="914400" rtl="0" eaLnBrk="1" fontAlgn="auto" latinLnBrk="0" hangingPunct="1">
+              <a:lnSpc>
+                <a:spcPct val="100000"/>
+              </a:lnSpc>
+              <a:spcBef>
+                <a:spcPts val="0"/>
+              </a:spcBef>
+              <a:spcAft>
+                <a:spcPts val="0"/>
+              </a:spcAft>
+              <a:buClrTx/>
+              <a:buSzTx/>
+              <a:buFontTx/>
+              <a:buChar char="-"/>
+              <a:tabLst/>
+              <a:defRPr/>
+            </a:pPr>
+            <a:endParaRPr lang="en-US" b="0" dirty="0"/>
+          </a:p>
+        </p:txBody>
+      </p:sp>
+      <p:sp>
+        <p:nvSpPr>
+          <p:cNvPr id="4" name="Slide Number Placeholder 3"/>
+          <p:cNvSpPr>
+            <a:spLocks noGrp="1"/>
+          </p:cNvSpPr>
+          <p:nvPr>
+            <p:ph type="sldNum" sz="quarter" idx="10"/>
+          </p:nvPr>
+        </p:nvSpPr>
+        <p:spPr/>
+        <p:txBody>
+          <a:bodyPr/>
+          <a:lstStyle/>
+          <a:p>
+            <a:fld id="{595D0871-5AD0-4670-BDA8-FBE649F625DD}" type="slidenum">
+              <a:rPr lang="he-IL" smtClean="0"/>
+              <a:t>5</a:t>
+            </a:fld>
+            <a:endParaRPr lang="he-IL"/>
+          </a:p>
+        </p:txBody>
+      </p:sp>
+    </p:spTree>
+    <p:extLst>
+      <p:ext uri="{BB962C8B-B14F-4D97-AF65-F5344CB8AC3E}">
+        <p14:creationId xmlns:p14="http://schemas.microsoft.com/office/powerpoint/2010/main" val="2042305765"/>
+      </p:ext>
+    </p:extLst>
+  </p:cSld>
+  <p:clrMapOvr>
+    <a:masterClrMapping/>
+  </p:clrMapOvr>
+</p:notes>
+</file>
+
+<file path=ppt/notesSlides/notesSlide6.xml><?xml version="1.0" encoding="utf-8"?>
+<p:notes xmlns:a="http://schemas.openxmlformats.org/drawingml/2006/main" xmlns:r="http://schemas.openxmlformats.org/officeDocument/2006/relationships" xmlns:p="http://schemas.openxmlformats.org/presentationml/2006/main">
+  <p:cSld>
+    <p:spTree>
+      <p:nvGrpSpPr>
+        <p:cNvPr id="1" name=""/>
+        <p:cNvGrpSpPr/>
+        <p:nvPr/>
+      </p:nvGrpSpPr>
+      <p:grpSpPr>
+        <a:xfrm>
+          <a:off x="0" y="0"/>
+          <a:ext cx="0" cy="0"/>
+          <a:chOff x="0" y="0"/>
+          <a:chExt cx="0" cy="0"/>
+        </a:xfrm>
+      </p:grpSpPr>
+      <p:sp>
+        <p:nvSpPr>
+          <p:cNvPr id="2" name="Slide Image Placeholder 1"/>
+          <p:cNvSpPr>
+            <a:spLocks noGrp="1" noRot="1" noChangeAspect="1"/>
+          </p:cNvSpPr>
+          <p:nvPr>
+            <p:ph type="sldImg"/>
+          </p:nvPr>
+        </p:nvSpPr>
+        <p:spPr/>
+      </p:sp>
+      <p:sp>
+        <p:nvSpPr>
+          <p:cNvPr id="3" name="Notes Placeholder 2"/>
+          <p:cNvSpPr>
+            <a:spLocks noGrp="1"/>
+          </p:cNvSpPr>
+          <p:nvPr>
+            <p:ph type="body" idx="1"/>
+          </p:nvPr>
+        </p:nvSpPr>
+        <p:spPr/>
+        <p:txBody>
+          <a:bodyPr/>
+          <a:lstStyle/>
+          <a:p>
+            <a:pPr marL="0" marR="0" lvl="0" indent="0" algn="l" defTabSz="914400" rtl="0" eaLnBrk="1" fontAlgn="auto" latinLnBrk="0" hangingPunct="1">
+              <a:lnSpc>
+                <a:spcPct val="100000"/>
+              </a:lnSpc>
+              <a:spcBef>
+                <a:spcPts val="0"/>
+              </a:spcBef>
+              <a:spcAft>
+                <a:spcPts val="0"/>
+              </a:spcAft>
+              <a:buClrTx/>
+              <a:buSzTx/>
+              <a:buFontTx/>
+              <a:buNone/>
+              <a:tabLst/>
+              <a:defRPr/>
+            </a:pPr>
+            <a:r>
+              <a:rPr lang="en-US" b="0" dirty="0"/>
+              <a:t>We have 3 main display:</a:t>
+            </a:r>
+          </a:p>
+          <a:p>
+            <a:pPr algn="l" rtl="0"/>
+            <a:r>
+              <a:rPr lang="en-US" sz="1200" b="0" i="0" kern="1200" dirty="0">
+                <a:solidFill>
+                  <a:schemeClr val="tx1"/>
+                </a:solidFill>
+                <a:effectLst/>
+                <a:latin typeface="+mn-lt"/>
+                <a:ea typeface="+mn-ea"/>
+                <a:cs typeface="+mn-cs"/>
+              </a:rPr>
+              <a:t>display: block</a:t>
+            </a:r>
+          </a:p>
+          <a:p>
+            <a:pPr algn="l" rtl="0"/>
+            <a:r>
+              <a:rPr lang="en-US" sz="1200" b="0" i="0" kern="1200" dirty="0">
+                <a:solidFill>
+                  <a:schemeClr val="tx1"/>
+                </a:solidFill>
+                <a:effectLst/>
+                <a:latin typeface="+mn-lt"/>
+                <a:ea typeface="+mn-ea"/>
+                <a:cs typeface="+mn-cs"/>
+              </a:rPr>
+              <a:t>display: inline</a:t>
+            </a:r>
+          </a:p>
+          <a:p>
+            <a:pPr algn="l" rtl="0"/>
+            <a:r>
+              <a:rPr lang="en-US" sz="1200" b="0" i="0" kern="1200" dirty="0">
+                <a:solidFill>
+                  <a:schemeClr val="tx1"/>
+                </a:solidFill>
+                <a:effectLst/>
+                <a:latin typeface="+mn-lt"/>
+                <a:ea typeface="+mn-ea"/>
+                <a:cs typeface="+mn-cs"/>
+              </a:rPr>
+              <a:t>display: inline-block</a:t>
+            </a:r>
+          </a:p>
+          <a:p>
+            <a:pPr marL="0" marR="0" lvl="0" indent="0" algn="l" defTabSz="914400" rtl="0" eaLnBrk="1" fontAlgn="auto" latinLnBrk="0" hangingPunct="1">
+              <a:lnSpc>
+                <a:spcPct val="100000"/>
+              </a:lnSpc>
+              <a:spcBef>
+                <a:spcPts val="0"/>
+              </a:spcBef>
+              <a:spcAft>
+                <a:spcPts val="0"/>
+              </a:spcAft>
+              <a:buClrTx/>
+              <a:buSzTx/>
+              <a:buFontTx/>
+              <a:buNone/>
+              <a:tabLst/>
+              <a:defRPr/>
+            </a:pPr>
+            <a:endParaRPr lang="en-US" b="0" dirty="0"/>
+          </a:p>
+          <a:p>
+            <a:pPr algn="l" rtl="0"/>
+            <a:r>
+              <a:rPr lang="en-US" sz="1200" b="1" i="0" kern="1200" dirty="0">
+                <a:solidFill>
+                  <a:schemeClr val="tx1"/>
+                </a:solidFill>
+                <a:effectLst/>
+                <a:latin typeface="+mn-lt"/>
+                <a:ea typeface="+mn-ea"/>
+                <a:cs typeface="+mn-cs"/>
+              </a:rPr>
+              <a:t>Block-level elements</a:t>
+            </a:r>
+          </a:p>
+          <a:p>
+            <a:pPr marL="171450" indent="-171450" algn="l" rtl="0">
+              <a:buFontTx/>
+              <a:buChar char="-"/>
+            </a:pPr>
+            <a:r>
+              <a:rPr lang="en-US" sz="1200" b="0" i="0" kern="1200" dirty="0">
+                <a:solidFill>
+                  <a:schemeClr val="tx1"/>
+                </a:solidFill>
+                <a:effectLst/>
+                <a:latin typeface="+mn-lt"/>
+                <a:ea typeface="+mn-ea"/>
+                <a:cs typeface="+mn-cs"/>
+              </a:rPr>
+              <a:t>Take full-width (100% width) by default</a:t>
+            </a:r>
+          </a:p>
+          <a:p>
+            <a:pPr marL="171450" indent="-171450" algn="l" rtl="0">
+              <a:buFontTx/>
+              <a:buChar char="-"/>
+            </a:pPr>
+            <a:r>
+              <a:rPr lang="en-US" sz="1200" b="0" i="0" kern="1200" dirty="0">
+                <a:solidFill>
+                  <a:schemeClr val="tx1"/>
+                </a:solidFill>
+                <a:effectLst/>
+                <a:latin typeface="+mn-lt"/>
+                <a:ea typeface="+mn-ea"/>
+                <a:cs typeface="+mn-cs"/>
+              </a:rPr>
+              <a:t>Each gets displayed in a new line</a:t>
+            </a:r>
+          </a:p>
+          <a:p>
+            <a:pPr marL="171450" indent="-171450" algn="l" rtl="0">
+              <a:buFontTx/>
+              <a:buChar char="-"/>
+            </a:pPr>
+            <a:r>
+              <a:rPr lang="en-US" sz="1200" b="0" i="0" kern="1200" dirty="0">
+                <a:solidFill>
+                  <a:schemeClr val="tx1"/>
+                </a:solidFill>
+                <a:effectLst/>
+                <a:latin typeface="+mn-lt"/>
+                <a:ea typeface="+mn-ea"/>
+                <a:cs typeface="+mn-cs"/>
+              </a:rPr>
+              <a:t>Width &amp; height properties can be set</a:t>
+            </a:r>
+          </a:p>
+          <a:p>
+            <a:pPr marL="171450" indent="-171450" algn="l" rtl="0">
+              <a:buFontTx/>
+              <a:buChar char="-"/>
+            </a:pPr>
+            <a:r>
+              <a:rPr lang="en-US" sz="1200" b="0" i="0" kern="1200" dirty="0">
+                <a:solidFill>
+                  <a:schemeClr val="tx1"/>
+                </a:solidFill>
+                <a:effectLst/>
+                <a:latin typeface="+mn-lt"/>
+                <a:ea typeface="+mn-ea"/>
+                <a:cs typeface="+mn-cs"/>
+              </a:rPr>
+              <a:t>Can contain other block or inline elements</a:t>
+            </a:r>
+          </a:p>
+          <a:p>
+            <a:pPr marL="171450" indent="-171450" algn="l" rtl="0">
+              <a:buFontTx/>
+              <a:buChar char="-"/>
+            </a:pPr>
+            <a:endParaRPr lang="en-US" sz="1200" b="0" i="0" kern="1200" dirty="0">
+              <a:solidFill>
+                <a:schemeClr val="tx1"/>
+              </a:solidFill>
+              <a:effectLst/>
+              <a:latin typeface="+mn-lt"/>
+              <a:ea typeface="+mn-ea"/>
+              <a:cs typeface="+mn-cs"/>
+            </a:endParaRPr>
+          </a:p>
+          <a:p>
+            <a:pPr algn="l" rtl="0"/>
+            <a:r>
+              <a:rPr lang="en-US" sz="1200" b="1" i="0" kern="1200" dirty="0">
+                <a:solidFill>
+                  <a:schemeClr val="tx1"/>
+                </a:solidFill>
+                <a:effectLst/>
+                <a:latin typeface="+mn-lt"/>
+                <a:ea typeface="+mn-ea"/>
+                <a:cs typeface="+mn-cs"/>
+              </a:rPr>
+              <a:t>Inline elements</a:t>
+            </a:r>
+          </a:p>
+          <a:p>
+            <a:pPr marL="171450" indent="-171450" algn="l" rtl="0">
+              <a:buFontTx/>
+              <a:buChar char="-"/>
+            </a:pPr>
+            <a:r>
+              <a:rPr lang="en-US" sz="1200" b="0" i="0" kern="1200" dirty="0">
+                <a:solidFill>
+                  <a:schemeClr val="tx1"/>
+                </a:solidFill>
+                <a:effectLst/>
+                <a:latin typeface="+mn-lt"/>
+                <a:ea typeface="+mn-ea"/>
+                <a:cs typeface="+mn-cs"/>
+              </a:rPr>
+              <a:t>Take only as much space as they need</a:t>
+            </a:r>
+          </a:p>
+          <a:p>
+            <a:pPr marL="171450" indent="-171450" algn="l" rtl="0">
+              <a:buFontTx/>
+              <a:buChar char="-"/>
+            </a:pPr>
+            <a:r>
+              <a:rPr lang="en-US" sz="1200" b="0" i="0" kern="1200" dirty="0">
+                <a:solidFill>
+                  <a:schemeClr val="tx1"/>
+                </a:solidFill>
+                <a:effectLst/>
+                <a:latin typeface="+mn-lt"/>
+                <a:ea typeface="+mn-ea"/>
+                <a:cs typeface="+mn-cs"/>
+              </a:rPr>
+              <a:t>Displayed side by side</a:t>
+            </a:r>
+          </a:p>
+          <a:p>
+            <a:pPr marL="171450" indent="-171450" algn="l" rtl="0">
+              <a:buFontTx/>
+              <a:buChar char="-"/>
+            </a:pPr>
+            <a:r>
+              <a:rPr lang="en-US" sz="1200" b="0" i="0" kern="1200" dirty="0">
+                <a:solidFill>
+                  <a:schemeClr val="tx1"/>
+                </a:solidFill>
+                <a:effectLst/>
+                <a:latin typeface="+mn-lt"/>
+                <a:ea typeface="+mn-ea"/>
+                <a:cs typeface="+mn-cs"/>
+              </a:rPr>
+              <a:t>Don’t accept width or height properties, and top-bottom margin</a:t>
+            </a:r>
+          </a:p>
+          <a:p>
+            <a:pPr marL="171450" indent="-171450" algn="l" rtl="0">
+              <a:buFontTx/>
+              <a:buChar char="-"/>
+            </a:pPr>
+            <a:r>
+              <a:rPr lang="en-US" sz="1200" b="0" i="0" kern="1200" dirty="0">
+                <a:solidFill>
+                  <a:schemeClr val="tx1"/>
+                </a:solidFill>
+                <a:effectLst/>
+                <a:latin typeface="+mn-lt"/>
+                <a:ea typeface="+mn-ea"/>
+                <a:cs typeface="+mn-cs"/>
+              </a:rPr>
+              <a:t>Can be a parent of other inline elements</a:t>
+            </a:r>
+          </a:p>
+          <a:p>
+            <a:pPr marL="0" indent="0" algn="l" rtl="0">
+              <a:buFontTx/>
+              <a:buNone/>
+            </a:pPr>
+            <a:endParaRPr lang="en-US" sz="1200" b="0" i="0" kern="1200" dirty="0">
+              <a:solidFill>
+                <a:schemeClr val="tx1"/>
+              </a:solidFill>
+              <a:effectLst/>
+              <a:latin typeface="+mn-lt"/>
+              <a:ea typeface="+mn-ea"/>
+              <a:cs typeface="+mn-cs"/>
+            </a:endParaRPr>
+          </a:p>
+          <a:p>
+            <a:pPr marL="0" marR="0" lvl="0" indent="0" algn="l" defTabSz="914400" rtl="0" eaLnBrk="1" fontAlgn="auto" latinLnBrk="0" hangingPunct="1">
+              <a:lnSpc>
+                <a:spcPct val="100000"/>
+              </a:lnSpc>
+              <a:spcBef>
+                <a:spcPts val="0"/>
+              </a:spcBef>
+              <a:spcAft>
+                <a:spcPts val="0"/>
+              </a:spcAft>
+              <a:buClrTx/>
+              <a:buSzTx/>
+              <a:buFontTx/>
+              <a:buNone/>
+              <a:tabLst/>
+              <a:defRPr/>
+            </a:pPr>
+            <a:r>
+              <a:rPr lang="en-US" sz="1200" b="1" i="0" kern="1200" dirty="0">
+                <a:solidFill>
+                  <a:schemeClr val="tx1"/>
+                </a:solidFill>
+                <a:effectLst/>
+                <a:latin typeface="+mn-lt"/>
+                <a:ea typeface="+mn-ea"/>
+                <a:cs typeface="+mn-cs"/>
+              </a:rPr>
+              <a:t>Display: Inline-block</a:t>
+            </a:r>
+          </a:p>
+          <a:p>
+            <a:pPr marL="0" marR="0" lvl="0" indent="0" algn="l" defTabSz="914400" rtl="0" eaLnBrk="1" fontAlgn="auto" latinLnBrk="0" hangingPunct="1">
+              <a:lnSpc>
+                <a:spcPct val="100000"/>
+              </a:lnSpc>
+              <a:spcBef>
+                <a:spcPts val="0"/>
+              </a:spcBef>
+              <a:spcAft>
+                <a:spcPts val="0"/>
+              </a:spcAft>
+              <a:buClrTx/>
+              <a:buSzTx/>
+              <a:buFontTx/>
+              <a:buNone/>
+              <a:tabLst/>
+              <a:defRPr/>
+            </a:pPr>
+            <a:r>
+              <a:rPr lang="en-US" sz="1200" b="0" i="0" kern="1200" dirty="0">
+                <a:solidFill>
+                  <a:schemeClr val="tx1"/>
+                </a:solidFill>
+                <a:effectLst/>
+                <a:latin typeface="+mn-lt"/>
+                <a:ea typeface="+mn-ea"/>
+                <a:cs typeface="+mn-cs"/>
+              </a:rPr>
+              <a:t>It’s a combination of block and inline elements.</a:t>
+            </a:r>
+          </a:p>
+          <a:p>
+            <a:pPr marL="0" marR="0" lvl="0" indent="0" algn="l" defTabSz="914400" rtl="0" eaLnBrk="1" fontAlgn="auto" latinLnBrk="0" hangingPunct="1">
+              <a:lnSpc>
+                <a:spcPct val="100000"/>
+              </a:lnSpc>
+              <a:spcBef>
+                <a:spcPts val="0"/>
+              </a:spcBef>
+              <a:spcAft>
+                <a:spcPts val="0"/>
+              </a:spcAft>
+              <a:buClrTx/>
+              <a:buSzTx/>
+              <a:buFontTx/>
+              <a:buNone/>
+              <a:tabLst/>
+              <a:defRPr/>
+            </a:pPr>
+            <a:r>
+              <a:rPr lang="en-US" sz="1200" b="0" i="0" kern="1200" dirty="0">
+                <a:solidFill>
+                  <a:schemeClr val="tx1"/>
+                </a:solidFill>
+                <a:effectLst/>
+                <a:latin typeface="+mn-lt"/>
+                <a:ea typeface="+mn-ea"/>
+                <a:cs typeface="+mn-cs"/>
+              </a:rPr>
+              <a:t>In other words, we can think of an inline element, that width &amp; height properties can be set, or we can think of a block-level element, that doesn’t have to start with a new line.</a:t>
+            </a:r>
+            <a:endParaRPr lang="en-US" b="0" dirty="0"/>
+          </a:p>
+          <a:p>
+            <a:pPr marL="0" marR="0" lvl="0" indent="0" algn="l" defTabSz="914400" rtl="0" eaLnBrk="1" fontAlgn="auto" latinLnBrk="0" hangingPunct="1">
+              <a:lnSpc>
+                <a:spcPct val="100000"/>
+              </a:lnSpc>
+              <a:spcBef>
+                <a:spcPts val="0"/>
+              </a:spcBef>
+              <a:spcAft>
+                <a:spcPts val="0"/>
+              </a:spcAft>
+              <a:buClrTx/>
+              <a:buSzTx/>
+              <a:buFontTx/>
+              <a:buNone/>
+              <a:tabLst/>
+              <a:defRPr/>
+            </a:pPr>
+            <a:endParaRPr lang="en-US" b="0" dirty="0"/>
+          </a:p>
+          <a:p>
+            <a:pPr marL="0" marR="0" lvl="0" indent="0" algn="l" defTabSz="914400" rtl="0" eaLnBrk="1" fontAlgn="auto" latinLnBrk="0" hangingPunct="1">
+              <a:lnSpc>
+                <a:spcPct val="100000"/>
+              </a:lnSpc>
+              <a:spcBef>
+                <a:spcPts val="0"/>
+              </a:spcBef>
+              <a:spcAft>
+                <a:spcPts val="0"/>
+              </a:spcAft>
+              <a:buClrTx/>
+              <a:buSzTx/>
+              <a:buFontTx/>
+              <a:buNone/>
+              <a:tabLst/>
+              <a:defRPr/>
+            </a:pPr>
+            <a:r>
+              <a:rPr lang="en-US" sz="1200" b="1" i="0" kern="1200" dirty="0">
+                <a:solidFill>
+                  <a:schemeClr val="tx1"/>
+                </a:solidFill>
+                <a:effectLst/>
+                <a:latin typeface="+mn-lt"/>
+                <a:ea typeface="+mn-ea"/>
+                <a:cs typeface="+mn-cs"/>
+              </a:rPr>
+              <a:t>Display: Flex</a:t>
+            </a:r>
+          </a:p>
+          <a:p>
+            <a:pPr marL="0" marR="0" lvl="0" indent="0" algn="l" defTabSz="914400" rtl="0" eaLnBrk="1" fontAlgn="auto" latinLnBrk="0" hangingPunct="1">
+              <a:lnSpc>
+                <a:spcPct val="100000"/>
+              </a:lnSpc>
+              <a:spcBef>
+                <a:spcPts val="0"/>
+              </a:spcBef>
+              <a:spcAft>
+                <a:spcPts val="0"/>
+              </a:spcAft>
+              <a:buClrTx/>
+              <a:buSzTx/>
+              <a:buFontTx/>
+              <a:buNone/>
+              <a:tabLst/>
+              <a:defRPr/>
+            </a:pPr>
+            <a:r>
+              <a:rPr lang="en-US" sz="1200" b="0" i="0" kern="1200" dirty="0">
+                <a:solidFill>
+                  <a:schemeClr val="tx1"/>
+                </a:solidFill>
+                <a:effectLst/>
+                <a:latin typeface="+mn-lt"/>
+                <a:ea typeface="+mn-ea"/>
+                <a:cs typeface="+mn-cs"/>
+              </a:rPr>
+              <a:t>We had a problem to layout the page (position elements),</a:t>
+            </a:r>
+          </a:p>
+          <a:p>
+            <a:pPr marL="0" marR="0" lvl="0" indent="0" algn="l" defTabSz="914400" rtl="0" eaLnBrk="1" fontAlgn="auto" latinLnBrk="0" hangingPunct="1">
+              <a:lnSpc>
+                <a:spcPct val="100000"/>
+              </a:lnSpc>
+              <a:spcBef>
+                <a:spcPts val="0"/>
+              </a:spcBef>
+              <a:spcAft>
+                <a:spcPts val="0"/>
+              </a:spcAft>
+              <a:buClrTx/>
+              <a:buSzTx/>
+              <a:buFontTx/>
+              <a:buNone/>
+              <a:tabLst/>
+              <a:defRPr/>
+            </a:pPr>
+            <a:r>
+              <a:rPr lang="en-US" sz="1200" b="0" i="0" kern="1200" dirty="0">
+                <a:solidFill>
+                  <a:schemeClr val="tx1"/>
+                </a:solidFill>
+                <a:effectLst/>
+                <a:latin typeface="+mn-lt"/>
+                <a:ea typeface="+mn-ea"/>
+                <a:cs typeface="+mn-cs"/>
+              </a:rPr>
+              <a:t>We use to try solve them with tricks like using position absolute; float left , tables etc.</a:t>
+            </a:r>
+          </a:p>
+          <a:p>
+            <a:pPr marL="0" marR="0" lvl="0" indent="0" algn="l" defTabSz="914400" rtl="0" eaLnBrk="1" fontAlgn="auto" latinLnBrk="0" hangingPunct="1">
+              <a:lnSpc>
+                <a:spcPct val="100000"/>
+              </a:lnSpc>
+              <a:spcBef>
+                <a:spcPts val="0"/>
+              </a:spcBef>
+              <a:spcAft>
+                <a:spcPts val="0"/>
+              </a:spcAft>
+              <a:buClrTx/>
+              <a:buSzTx/>
+              <a:buFontTx/>
+              <a:buNone/>
+              <a:tabLst/>
+              <a:defRPr/>
+            </a:pPr>
+            <a:r>
+              <a:rPr lang="en-US" sz="1200" b="0" i="0" kern="1200" dirty="0">
+                <a:solidFill>
+                  <a:schemeClr val="tx1"/>
+                </a:solidFill>
+                <a:effectLst/>
+                <a:latin typeface="+mn-lt"/>
+                <a:ea typeface="+mn-ea"/>
+                <a:cs typeface="+mn-cs"/>
+              </a:rPr>
+              <a:t>Now we have flex, unlike other display it’s not talking about element itself, it’s talking about position children elements.</a:t>
+            </a:r>
+          </a:p>
+          <a:p>
+            <a:pPr marL="0" marR="0" lvl="0" indent="0" algn="l" defTabSz="914400" rtl="0" eaLnBrk="1" fontAlgn="auto" latinLnBrk="0" hangingPunct="1">
+              <a:lnSpc>
+                <a:spcPct val="100000"/>
+              </a:lnSpc>
+              <a:spcBef>
+                <a:spcPts val="0"/>
+              </a:spcBef>
+              <a:spcAft>
+                <a:spcPts val="0"/>
+              </a:spcAft>
+              <a:buClrTx/>
+              <a:buSzTx/>
+              <a:buFontTx/>
+              <a:buNone/>
+              <a:tabLst/>
+              <a:defRPr/>
+            </a:pPr>
+            <a:endParaRPr lang="en-US" sz="1200" b="0" i="0" kern="1200" dirty="0">
+              <a:solidFill>
+                <a:schemeClr val="tx1"/>
+              </a:solidFill>
+              <a:effectLst/>
+              <a:latin typeface="+mn-lt"/>
+              <a:ea typeface="+mn-ea"/>
+              <a:cs typeface="+mn-cs"/>
+            </a:endParaRPr>
+          </a:p>
+          <a:p>
+            <a:pPr marL="0" marR="0" lvl="0" indent="0" algn="l" defTabSz="914400" rtl="0" eaLnBrk="1" fontAlgn="auto" latinLnBrk="0" hangingPunct="1">
+              <a:lnSpc>
+                <a:spcPct val="100000"/>
+              </a:lnSpc>
+              <a:spcBef>
+                <a:spcPts val="0"/>
+              </a:spcBef>
+              <a:spcAft>
+                <a:spcPts val="0"/>
+              </a:spcAft>
+              <a:buClrTx/>
+              <a:buSzTx/>
+              <a:buFontTx/>
+              <a:buNone/>
+              <a:tabLst/>
+              <a:defRPr/>
+            </a:pPr>
+            <a:r>
+              <a:rPr lang="en-US" sz="1200" b="1" i="0" kern="1200" dirty="0">
+                <a:solidFill>
+                  <a:schemeClr val="tx1"/>
+                </a:solidFill>
+                <a:effectLst/>
+                <a:latin typeface="+mn-lt"/>
+                <a:ea typeface="+mn-ea"/>
+                <a:cs typeface="+mn-cs"/>
+              </a:rPr>
+              <a:t>Display: Grid</a:t>
+            </a:r>
+          </a:p>
+          <a:p>
+            <a:pPr marL="0" marR="0" lvl="0" indent="0" algn="l" defTabSz="914400" rtl="0" eaLnBrk="1" fontAlgn="auto" latinLnBrk="0" hangingPunct="1">
+              <a:lnSpc>
+                <a:spcPct val="100000"/>
+              </a:lnSpc>
+              <a:spcBef>
+                <a:spcPts val="0"/>
+              </a:spcBef>
+              <a:spcAft>
+                <a:spcPts val="0"/>
+              </a:spcAft>
+              <a:buClrTx/>
+              <a:buSzTx/>
+              <a:buFontTx/>
+              <a:buNone/>
+              <a:tabLst/>
+              <a:defRPr/>
+            </a:pPr>
+            <a:r>
+              <a:rPr lang="en-US" sz="1200" b="0" i="0" kern="1200" dirty="0">
+                <a:solidFill>
+                  <a:schemeClr val="tx1"/>
+                </a:solidFill>
+                <a:effectLst/>
+                <a:latin typeface="+mn-lt"/>
+                <a:ea typeface="+mn-ea"/>
+                <a:cs typeface="+mn-cs"/>
+              </a:rPr>
+              <a:t>Flex was great but we want something better for global/big layout.</a:t>
+            </a:r>
+          </a:p>
+          <a:p>
+            <a:pPr marL="0" marR="0" lvl="0" indent="0" algn="l" defTabSz="914400" rtl="0" eaLnBrk="1" fontAlgn="auto" latinLnBrk="0" hangingPunct="1">
+              <a:lnSpc>
+                <a:spcPct val="100000"/>
+              </a:lnSpc>
+              <a:spcBef>
+                <a:spcPts val="0"/>
+              </a:spcBef>
+              <a:spcAft>
+                <a:spcPts val="0"/>
+              </a:spcAft>
+              <a:buClrTx/>
+              <a:buSzTx/>
+              <a:buFontTx/>
+              <a:buNone/>
+              <a:tabLst/>
+              <a:defRPr/>
+            </a:pPr>
+            <a:r>
+              <a:rPr lang="en-US" sz="1200" b="0" i="0" kern="1200" dirty="0">
+                <a:solidFill>
+                  <a:schemeClr val="tx1"/>
+                </a:solidFill>
+                <a:effectLst/>
+                <a:latin typeface="+mn-lt"/>
+                <a:ea typeface="+mn-ea"/>
+                <a:cs typeface="+mn-cs"/>
+              </a:rPr>
+              <a:t>For that we have grid.</a:t>
+            </a:r>
+          </a:p>
+          <a:p>
+            <a:pPr marL="0" marR="0" lvl="0" indent="0" algn="l" defTabSz="914400" rtl="0" eaLnBrk="1" fontAlgn="auto" latinLnBrk="0" hangingPunct="1">
+              <a:lnSpc>
+                <a:spcPct val="100000"/>
+              </a:lnSpc>
+              <a:spcBef>
+                <a:spcPts val="0"/>
+              </a:spcBef>
+              <a:spcAft>
+                <a:spcPts val="0"/>
+              </a:spcAft>
+              <a:buClrTx/>
+              <a:buSzTx/>
+              <a:buFontTx/>
+              <a:buNone/>
+              <a:tabLst/>
+              <a:defRPr/>
+            </a:pPr>
+            <a:r>
+              <a:rPr lang="en-US" sz="1200" b="0" i="0" kern="1200" dirty="0">
+                <a:solidFill>
+                  <a:schemeClr val="tx1"/>
+                </a:solidFill>
+                <a:effectLst/>
+                <a:latin typeface="+mn-lt"/>
+                <a:ea typeface="+mn-ea"/>
+                <a:cs typeface="+mn-cs"/>
+              </a:rPr>
+              <a:t>It’s like flex but 2 </a:t>
+            </a:r>
+            <a:r>
+              <a:rPr lang="en-US" sz="1200" b="0" i="0" kern="1200" dirty="0" err="1">
+                <a:solidFill>
+                  <a:schemeClr val="tx1"/>
+                </a:solidFill>
+                <a:effectLst/>
+                <a:latin typeface="+mn-lt"/>
+                <a:ea typeface="+mn-ea"/>
+                <a:cs typeface="+mn-cs"/>
+              </a:rPr>
+              <a:t>demention</a:t>
+            </a:r>
+            <a:r>
+              <a:rPr lang="en-US" sz="1200" b="0" i="0" kern="1200">
+                <a:solidFill>
+                  <a:schemeClr val="tx1"/>
+                </a:solidFill>
+                <a:effectLst/>
+                <a:latin typeface="+mn-lt"/>
+                <a:ea typeface="+mn-ea"/>
+                <a:cs typeface="+mn-cs"/>
+              </a:rPr>
+              <a:t>.</a:t>
+            </a:r>
+            <a:endParaRPr lang="en-US" sz="1200" b="0" i="0" kern="1200" dirty="0">
+              <a:solidFill>
+                <a:schemeClr val="tx1"/>
+              </a:solidFill>
+              <a:effectLst/>
+              <a:latin typeface="+mn-lt"/>
+              <a:ea typeface="+mn-ea"/>
+              <a:cs typeface="+mn-cs"/>
+            </a:endParaRPr>
+          </a:p>
+          <a:p>
+            <a:pPr marL="0" marR="0" lvl="0" indent="0" algn="l" defTabSz="914400" rtl="0" eaLnBrk="1" fontAlgn="auto" latinLnBrk="0" hangingPunct="1">
+              <a:lnSpc>
+                <a:spcPct val="100000"/>
+              </a:lnSpc>
+              <a:spcBef>
+                <a:spcPts val="0"/>
+              </a:spcBef>
+              <a:spcAft>
+                <a:spcPts val="0"/>
+              </a:spcAft>
+              <a:buClrTx/>
+              <a:buSzTx/>
+              <a:buFontTx/>
+              <a:buNone/>
+              <a:tabLst/>
+              <a:defRPr/>
+            </a:pPr>
+            <a:endParaRPr lang="en-US" sz="1200" b="0" i="0" kern="1200" dirty="0">
+              <a:solidFill>
+                <a:schemeClr val="tx1"/>
+              </a:solidFill>
+              <a:effectLst/>
+              <a:latin typeface="+mn-lt"/>
+              <a:ea typeface="+mn-ea"/>
+              <a:cs typeface="+mn-cs"/>
+            </a:endParaRPr>
+          </a:p>
+          <a:p>
+            <a:pPr marL="0" marR="0" lvl="0" indent="0" algn="l" defTabSz="914400" rtl="0" eaLnBrk="1" fontAlgn="auto" latinLnBrk="0" hangingPunct="1">
+              <a:lnSpc>
+                <a:spcPct val="100000"/>
+              </a:lnSpc>
+              <a:spcBef>
+                <a:spcPts val="0"/>
+              </a:spcBef>
+              <a:spcAft>
+                <a:spcPts val="0"/>
+              </a:spcAft>
+              <a:buClrTx/>
+              <a:buSzTx/>
+              <a:buFontTx/>
+              <a:buNone/>
+              <a:tabLst/>
+              <a:defRPr/>
+            </a:pPr>
+            <a:endParaRPr lang="en-US" sz="1200" b="0" i="0" kern="1200" dirty="0">
+              <a:solidFill>
+                <a:schemeClr val="tx1"/>
+              </a:solidFill>
+              <a:effectLst/>
+              <a:latin typeface="+mn-lt"/>
+              <a:ea typeface="+mn-ea"/>
+              <a:cs typeface="+mn-cs"/>
+            </a:endParaRPr>
+          </a:p>
+          <a:p>
+            <a:pPr marL="0" marR="0" lvl="0" indent="0" algn="l" defTabSz="914400" rtl="0" eaLnBrk="1" fontAlgn="auto" latinLnBrk="0" hangingPunct="1">
+              <a:lnSpc>
+                <a:spcPct val="100000"/>
+              </a:lnSpc>
+              <a:spcBef>
+                <a:spcPts val="0"/>
+              </a:spcBef>
+              <a:spcAft>
+                <a:spcPts val="0"/>
+              </a:spcAft>
+              <a:buClrTx/>
+              <a:buSzTx/>
+              <a:buFontTx/>
+              <a:buNone/>
+              <a:tabLst/>
+              <a:defRPr/>
+            </a:pPr>
+            <a:endParaRPr lang="en-US" sz="1200" b="0" i="0" kern="1200" dirty="0">
+              <a:solidFill>
+                <a:schemeClr val="tx1"/>
+              </a:solidFill>
+              <a:effectLst/>
+              <a:latin typeface="+mn-lt"/>
+              <a:ea typeface="+mn-ea"/>
+              <a:cs typeface="+mn-cs"/>
+            </a:endParaRPr>
+          </a:p>
+          <a:p>
+            <a:pPr marL="0" marR="0" lvl="0" indent="0" algn="l" defTabSz="914400" rtl="0" eaLnBrk="1" fontAlgn="auto" latinLnBrk="0" hangingPunct="1">
+              <a:lnSpc>
+                <a:spcPct val="100000"/>
+              </a:lnSpc>
+              <a:spcBef>
+                <a:spcPts val="0"/>
+              </a:spcBef>
+              <a:spcAft>
+                <a:spcPts val="0"/>
+              </a:spcAft>
+              <a:buClrTx/>
+              <a:buSzTx/>
+              <a:buFontTx/>
+              <a:buNone/>
+              <a:tabLst/>
+              <a:defRPr/>
+            </a:pPr>
+            <a:endParaRPr lang="en-US" b="0" dirty="0"/>
+          </a:p>
+          <a:p>
+            <a:pPr marL="171450" marR="0" lvl="0" indent="-171450" algn="l" defTabSz="914400" rtl="0" eaLnBrk="1" fontAlgn="auto" latinLnBrk="0" hangingPunct="1">
+              <a:lnSpc>
+                <a:spcPct val="100000"/>
+              </a:lnSpc>
+              <a:spcBef>
+                <a:spcPts val="0"/>
+              </a:spcBef>
+              <a:spcAft>
+                <a:spcPts val="0"/>
+              </a:spcAft>
+              <a:buClrTx/>
+              <a:buSzTx/>
+              <a:buFontTx/>
+              <a:buChar char="-"/>
+              <a:tabLst/>
+              <a:defRPr/>
+            </a:pPr>
+            <a:r>
+              <a:rPr lang="en-US" dirty="0">
+                <a:hlinkClick r:id="rId3"/>
+              </a:rPr>
+              <a:t>https://medium.com/better-programming/understanding-css-display-none-block-inline-and-inline-block-63f6510df93</a:t>
+            </a:r>
+            <a:endParaRPr lang="en-US" dirty="0"/>
+          </a:p>
+          <a:p>
+            <a:pPr marL="171450" marR="0" lvl="0" indent="-171450" algn="l" defTabSz="914400" rtl="0" eaLnBrk="1" fontAlgn="auto" latinLnBrk="0" hangingPunct="1">
+              <a:lnSpc>
+                <a:spcPct val="100000"/>
+              </a:lnSpc>
+              <a:spcBef>
+                <a:spcPts val="0"/>
+              </a:spcBef>
+              <a:spcAft>
+                <a:spcPts val="0"/>
+              </a:spcAft>
+              <a:buClrTx/>
+              <a:buSzTx/>
+              <a:buFontTx/>
+              <a:buChar char="-"/>
+              <a:tabLst/>
+              <a:defRPr/>
+            </a:pPr>
+            <a:r>
+              <a:rPr lang="en-US" dirty="0">
+                <a:hlinkClick r:id="rId4"/>
+              </a:rPr>
+              <a:t>https://css-tricks.com/snippets/css/a-guide-to-flexbox/</a:t>
+            </a:r>
+            <a:endParaRPr lang="en-US" dirty="0"/>
+          </a:p>
+          <a:p>
+            <a:pPr marL="171450" marR="0" lvl="0" indent="-171450" algn="l" defTabSz="914400" rtl="0" eaLnBrk="1" fontAlgn="auto" latinLnBrk="0" hangingPunct="1">
+              <a:lnSpc>
+                <a:spcPct val="100000"/>
+              </a:lnSpc>
+              <a:spcBef>
+                <a:spcPts val="0"/>
+              </a:spcBef>
+              <a:spcAft>
+                <a:spcPts val="0"/>
+              </a:spcAft>
+              <a:buClrTx/>
+              <a:buSzTx/>
+              <a:buFontTx/>
+              <a:buChar char="-"/>
+              <a:tabLst/>
+              <a:defRPr/>
+            </a:pPr>
+            <a:r>
+              <a:rPr lang="en-US" dirty="0">
+                <a:hlinkClick r:id="rId5"/>
+              </a:rPr>
+              <a:t>https://css-tricks.com/snippets/css/complete-guide-grid/</a:t>
+            </a:r>
+            <a:endParaRPr lang="en-US" b="0" dirty="0"/>
+          </a:p>
+        </p:txBody>
+      </p:sp>
+      <p:sp>
+        <p:nvSpPr>
+          <p:cNvPr id="4" name="Slide Number Placeholder 3"/>
+          <p:cNvSpPr>
+            <a:spLocks noGrp="1"/>
+          </p:cNvSpPr>
+          <p:nvPr>
+            <p:ph type="sldNum" sz="quarter" idx="10"/>
+          </p:nvPr>
+        </p:nvSpPr>
+        <p:spPr/>
+        <p:txBody>
+          <a:bodyPr/>
+          <a:lstStyle/>
+          <a:p>
+            <a:fld id="{595D0871-5AD0-4670-BDA8-FBE649F625DD}" type="slidenum">
+              <a:rPr lang="he-IL" smtClean="0"/>
+              <a:t>6</a:t>
+            </a:fld>
+            <a:endParaRPr lang="he-IL"/>
+          </a:p>
+        </p:txBody>
+      </p:sp>
+    </p:spTree>
+    <p:extLst>
+      <p:ext uri="{BB962C8B-B14F-4D97-AF65-F5344CB8AC3E}">
+        <p14:creationId xmlns:p14="http://schemas.microsoft.com/office/powerpoint/2010/main" val="1535689547"/>
+      </p:ext>
+    </p:extLst>
+  </p:cSld>
+  <p:clrMapOvr>
+    <a:masterClrMapping/>
+  </p:clrMapOvr>
+</p:notes>
+</file>
+
 <file path=ppt/slideLayouts/slideLayout1.xml><?xml version="1.0" encoding="utf-8"?>
 <p:sldLayout xmlns:a="http://schemas.openxmlformats.org/drawingml/2006/main" xmlns:r="http://schemas.openxmlformats.org/officeDocument/2006/relationships" xmlns:p="http://schemas.openxmlformats.org/presentationml/2006/main" type="title" preserve="1">
   <p:cSld name="שקופית כותרת">
@@ -820,7 +3427,7 @@
           <a:p>
             <a:fld id="{F472E424-CC75-4448-A1B5-6FCA6BFEE599}" type="datetimeFigureOut">
               <a:rPr lang="he-IL" smtClean="0"/>
-              <a:t>כ"ז/סיון/תשע"ט</a:t>
+              <a:t>י"ח/תמוז/תשע"ט</a:t>
             </a:fld>
             <a:endParaRPr lang="he-IL"/>
           </a:p>
@@ -988,7 +3595,7 @@
           <a:p>
             <a:fld id="{F472E424-CC75-4448-A1B5-6FCA6BFEE599}" type="datetimeFigureOut">
               <a:rPr lang="he-IL" smtClean="0"/>
-              <a:t>כ"ז/סיון/תשע"ט</a:t>
+              <a:t>י"ח/תמוז/תשע"ט</a:t>
             </a:fld>
             <a:endParaRPr lang="he-IL"/>
           </a:p>
@@ -1166,7 +3773,7 @@
           <a:p>
             <a:fld id="{F472E424-CC75-4448-A1B5-6FCA6BFEE599}" type="datetimeFigureOut">
               <a:rPr lang="he-IL" smtClean="0"/>
-              <a:t>כ"ז/סיון/תשע"ט</a:t>
+              <a:t>י"ח/תמוז/תשע"ט</a:t>
             </a:fld>
             <a:endParaRPr lang="he-IL"/>
           </a:p>
@@ -1334,7 +3941,7 @@
           <a:p>
             <a:fld id="{F472E424-CC75-4448-A1B5-6FCA6BFEE599}" type="datetimeFigureOut">
               <a:rPr lang="he-IL" smtClean="0"/>
-              <a:t>כ"ז/סיון/תשע"ט</a:t>
+              <a:t>י"ח/תמוז/תשע"ט</a:t>
             </a:fld>
             <a:endParaRPr lang="he-IL"/>
           </a:p>
@@ -1579,7 +4186,7 @@
           <a:p>
             <a:fld id="{F472E424-CC75-4448-A1B5-6FCA6BFEE599}" type="datetimeFigureOut">
               <a:rPr lang="he-IL" smtClean="0"/>
-              <a:t>כ"ז/סיון/תשע"ט</a:t>
+              <a:t>י"ח/תמוז/תשע"ט</a:t>
             </a:fld>
             <a:endParaRPr lang="he-IL"/>
           </a:p>
@@ -1808,7 +4415,7 @@
           <a:p>
             <a:fld id="{F472E424-CC75-4448-A1B5-6FCA6BFEE599}" type="datetimeFigureOut">
               <a:rPr lang="he-IL" smtClean="0"/>
-              <a:t>כ"ז/סיון/תשע"ט</a:t>
+              <a:t>י"ח/תמוז/תשע"ט</a:t>
             </a:fld>
             <a:endParaRPr lang="he-IL"/>
           </a:p>
@@ -2172,7 +4779,7 @@
           <a:p>
             <a:fld id="{F472E424-CC75-4448-A1B5-6FCA6BFEE599}" type="datetimeFigureOut">
               <a:rPr lang="he-IL" smtClean="0"/>
-              <a:t>כ"ז/סיון/תשע"ט</a:t>
+              <a:t>י"ח/תמוז/תשע"ט</a:t>
             </a:fld>
             <a:endParaRPr lang="he-IL"/>
           </a:p>
@@ -2289,7 +4896,7 @@
           <a:p>
             <a:fld id="{F472E424-CC75-4448-A1B5-6FCA6BFEE599}" type="datetimeFigureOut">
               <a:rPr lang="he-IL" smtClean="0"/>
-              <a:t>כ"ז/סיון/תשע"ט</a:t>
+              <a:t>י"ח/תמוז/תשע"ט</a:t>
             </a:fld>
             <a:endParaRPr lang="he-IL"/>
           </a:p>
@@ -2384,7 +4991,7 @@
           <a:p>
             <a:fld id="{F472E424-CC75-4448-A1B5-6FCA6BFEE599}" type="datetimeFigureOut">
               <a:rPr lang="he-IL" smtClean="0"/>
-              <a:t>כ"ז/סיון/תשע"ט</a:t>
+              <a:t>י"ח/תמוז/תשע"ט</a:t>
             </a:fld>
             <a:endParaRPr lang="he-IL"/>
           </a:p>
@@ -2659,7 +5266,7 @@
           <a:p>
             <a:fld id="{F472E424-CC75-4448-A1B5-6FCA6BFEE599}" type="datetimeFigureOut">
               <a:rPr lang="he-IL" smtClean="0"/>
-              <a:t>כ"ז/סיון/תשע"ט</a:t>
+              <a:t>י"ח/תמוז/תשע"ט</a:t>
             </a:fld>
             <a:endParaRPr lang="he-IL"/>
           </a:p>
@@ -2911,7 +5518,7 @@
           <a:p>
             <a:fld id="{F472E424-CC75-4448-A1B5-6FCA6BFEE599}" type="datetimeFigureOut">
               <a:rPr lang="he-IL" smtClean="0"/>
-              <a:t>כ"ז/סיון/תשע"ט</a:t>
+              <a:t>י"ח/תמוז/תשע"ט</a:t>
             </a:fld>
             <a:endParaRPr lang="he-IL"/>
           </a:p>
@@ -3122,7 +5729,7 @@
           <a:p>
             <a:fld id="{F472E424-CC75-4448-A1B5-6FCA6BFEE599}" type="datetimeFigureOut">
               <a:rPr lang="he-IL" smtClean="0"/>
-              <a:t>כ"ז/סיון/תשע"ט</a:t>
+              <a:t>י"ח/תמוז/תשע"ט</a:t>
             </a:fld>
             <a:endParaRPr lang="he-IL"/>
           </a:p>
@@ -3745,7 +6352,7 @@
                   <a:schemeClr val="bg1"/>
                 </a:solidFill>
               </a:rPr>
-              <a:t>Title</a:t>
+              <a:t>Transition to SPA</a:t>
             </a:r>
             <a:endParaRPr lang="en-US" altLang="en-US" sz="6000" b="1" dirty="0">
               <a:solidFill>
@@ -3760,6 +6367,534 @@
     <p:extLst>
       <p:ext uri="{BB962C8B-B14F-4D97-AF65-F5344CB8AC3E}">
         <p14:creationId xmlns:p14="http://schemas.microsoft.com/office/powerpoint/2010/main" val="2260368804"/>
+      </p:ext>
+    </p:extLst>
+  </p:cSld>
+  <p:clrMapOvr>
+    <a:masterClrMapping/>
+  </p:clrMapOvr>
+  <mc:AlternateContent xmlns:mc="http://schemas.openxmlformats.org/markup-compatibility/2006" xmlns:p14="http://schemas.microsoft.com/office/powerpoint/2010/main">
+    <mc:Choice Requires="p14">
+      <p:transition spd="med" p14:dur="700">
+        <p:fade/>
+      </p:transition>
+    </mc:Choice>
+    <mc:Fallback xmlns="">
+      <p:transition xmlns:p14="http://schemas.microsoft.com/office/powerpoint/2010/main" spd="med">
+        <p:fade/>
+      </p:transition>
+    </mc:Fallback>
+  </mc:AlternateContent>
+</p:sld>
+</file>
+
+<file path=ppt/slides/slide3.xml><?xml version="1.0" encoding="utf-8"?>
+<p:sld xmlns:a="http://schemas.openxmlformats.org/drawingml/2006/main" xmlns:r="http://schemas.openxmlformats.org/officeDocument/2006/relationships" xmlns:p="http://schemas.openxmlformats.org/presentationml/2006/main">
+  <p:cSld>
+    <p:spTree>
+      <p:nvGrpSpPr>
+        <p:cNvPr id="1" name=""/>
+        <p:cNvGrpSpPr/>
+        <p:nvPr/>
+      </p:nvGrpSpPr>
+      <p:grpSpPr>
+        <a:xfrm>
+          <a:off x="0" y="0"/>
+          <a:ext cx="0" cy="0"/>
+          <a:chOff x="0" y="0"/>
+          <a:chExt cx="0" cy="0"/>
+        </a:xfrm>
+      </p:grpSpPr>
+      <p:sp>
+        <p:nvSpPr>
+          <p:cNvPr id="6" name="Rectangle 5"/>
+          <p:cNvSpPr/>
+          <p:nvPr/>
+        </p:nvSpPr>
+        <p:spPr>
+          <a:xfrm>
+            <a:off x="-215115" y="0"/>
+            <a:ext cx="12407115" cy="6858000"/>
+          </a:xfrm>
+          <a:prstGeom prst="rect">
+            <a:avLst/>
+          </a:prstGeom>
+          <a:solidFill>
+            <a:schemeClr val="accent1">
+              <a:lumMod val="75000"/>
+            </a:schemeClr>
+          </a:solidFill>
+          <a:ln>
+            <a:noFill/>
+          </a:ln>
+        </p:spPr>
+        <p:style>
+          <a:lnRef idx="1">
+            <a:schemeClr val="accent1"/>
+          </a:lnRef>
+          <a:fillRef idx="3">
+            <a:schemeClr val="accent1"/>
+          </a:fillRef>
+          <a:effectRef idx="2">
+            <a:schemeClr val="accent1"/>
+          </a:effectRef>
+          <a:fontRef idx="minor">
+            <a:schemeClr val="lt1"/>
+          </a:fontRef>
+        </p:style>
+        <p:txBody>
+          <a:bodyPr rtlCol="0" anchor="ctr"/>
+          <a:lstStyle/>
+          <a:p>
+            <a:pPr algn="ctr"/>
+            <a:endParaRPr lang="en-US" sz="2400"/>
+          </a:p>
+        </p:txBody>
+      </p:sp>
+      <p:sp>
+        <p:nvSpPr>
+          <p:cNvPr id="24" name="Title 1"/>
+          <p:cNvSpPr>
+            <a:spLocks noGrp="1"/>
+          </p:cNvSpPr>
+          <p:nvPr>
+            <p:ph type="title"/>
+          </p:nvPr>
+        </p:nvSpPr>
+        <p:spPr>
+          <a:xfrm>
+            <a:off x="502042" y="1936377"/>
+            <a:ext cx="10972800" cy="2985246"/>
+          </a:xfrm>
+        </p:spPr>
+        <p:txBody>
+          <a:bodyPr>
+            <a:noAutofit/>
+          </a:bodyPr>
+          <a:lstStyle/>
+          <a:p>
+            <a:pPr algn="ctr" rtl="0" eaLnBrk="0" fontAlgn="base" hangingPunct="0">
+              <a:spcAft>
+                <a:spcPct val="0"/>
+              </a:spcAft>
+            </a:pPr>
+            <a:r>
+              <a:rPr lang="en-US" sz="6000" dirty="0">
+                <a:solidFill>
+                  <a:schemeClr val="bg1"/>
+                </a:solidFill>
+              </a:rPr>
+              <a:t>Transition to SPA</a:t>
+            </a:r>
+            <a:endParaRPr lang="en-US" altLang="en-US" sz="6000" b="1" dirty="0">
+              <a:solidFill>
+                <a:schemeClr val="bg1"/>
+              </a:solidFill>
+              <a:latin typeface="Calibri (Body)"/>
+            </a:endParaRPr>
+          </a:p>
+        </p:txBody>
+      </p:sp>
+    </p:spTree>
+    <p:extLst>
+      <p:ext uri="{BB962C8B-B14F-4D97-AF65-F5344CB8AC3E}">
+        <p14:creationId xmlns:p14="http://schemas.microsoft.com/office/powerpoint/2010/main" val="1986982371"/>
+      </p:ext>
+    </p:extLst>
+  </p:cSld>
+  <p:clrMapOvr>
+    <a:masterClrMapping/>
+  </p:clrMapOvr>
+  <mc:AlternateContent xmlns:mc="http://schemas.openxmlformats.org/markup-compatibility/2006" xmlns:p14="http://schemas.microsoft.com/office/powerpoint/2010/main">
+    <mc:Choice Requires="p14">
+      <p:transition spd="med" p14:dur="700">
+        <p:fade/>
+      </p:transition>
+    </mc:Choice>
+    <mc:Fallback xmlns="">
+      <p:transition xmlns:p14="http://schemas.microsoft.com/office/powerpoint/2010/main" spd="med">
+        <p:fade/>
+      </p:transition>
+    </mc:Fallback>
+  </mc:AlternateContent>
+</p:sld>
+</file>
+
+<file path=ppt/slides/slide4.xml><?xml version="1.0" encoding="utf-8"?>
+<p:sld xmlns:a="http://schemas.openxmlformats.org/drawingml/2006/main" xmlns:r="http://schemas.openxmlformats.org/officeDocument/2006/relationships" xmlns:p="http://schemas.openxmlformats.org/presentationml/2006/main">
+  <p:cSld>
+    <p:spTree>
+      <p:nvGrpSpPr>
+        <p:cNvPr id="1" name=""/>
+        <p:cNvGrpSpPr/>
+        <p:nvPr/>
+      </p:nvGrpSpPr>
+      <p:grpSpPr>
+        <a:xfrm>
+          <a:off x="0" y="0"/>
+          <a:ext cx="0" cy="0"/>
+          <a:chOff x="0" y="0"/>
+          <a:chExt cx="0" cy="0"/>
+        </a:xfrm>
+      </p:grpSpPr>
+      <p:sp>
+        <p:nvSpPr>
+          <p:cNvPr id="6" name="Rectangle 5"/>
+          <p:cNvSpPr/>
+          <p:nvPr/>
+        </p:nvSpPr>
+        <p:spPr>
+          <a:xfrm>
+            <a:off x="-215115" y="0"/>
+            <a:ext cx="12407115" cy="6858000"/>
+          </a:xfrm>
+          <a:prstGeom prst="rect">
+            <a:avLst/>
+          </a:prstGeom>
+          <a:solidFill>
+            <a:schemeClr val="accent1">
+              <a:lumMod val="75000"/>
+            </a:schemeClr>
+          </a:solidFill>
+          <a:ln>
+            <a:noFill/>
+          </a:ln>
+        </p:spPr>
+        <p:style>
+          <a:lnRef idx="1">
+            <a:schemeClr val="accent1"/>
+          </a:lnRef>
+          <a:fillRef idx="3">
+            <a:schemeClr val="accent1"/>
+          </a:fillRef>
+          <a:effectRef idx="2">
+            <a:schemeClr val="accent1"/>
+          </a:effectRef>
+          <a:fontRef idx="minor">
+            <a:schemeClr val="lt1"/>
+          </a:fontRef>
+        </p:style>
+        <p:txBody>
+          <a:bodyPr rtlCol="0" anchor="ctr"/>
+          <a:lstStyle/>
+          <a:p>
+            <a:pPr algn="ctr"/>
+            <a:endParaRPr lang="en-US" sz="2400"/>
+          </a:p>
+        </p:txBody>
+      </p:sp>
+      <p:sp>
+        <p:nvSpPr>
+          <p:cNvPr id="24" name="Title 1"/>
+          <p:cNvSpPr>
+            <a:spLocks noGrp="1"/>
+          </p:cNvSpPr>
+          <p:nvPr>
+            <p:ph type="title"/>
+          </p:nvPr>
+        </p:nvSpPr>
+        <p:spPr>
+          <a:xfrm>
+            <a:off x="502042" y="1936377"/>
+            <a:ext cx="10972800" cy="2985246"/>
+          </a:xfrm>
+        </p:spPr>
+        <p:txBody>
+          <a:bodyPr>
+            <a:noAutofit/>
+          </a:bodyPr>
+          <a:lstStyle/>
+          <a:p>
+            <a:pPr algn="ctr" rtl="0" eaLnBrk="0" fontAlgn="base" hangingPunct="0">
+              <a:spcAft>
+                <a:spcPct val="0"/>
+              </a:spcAft>
+            </a:pPr>
+            <a:r>
+              <a:rPr lang="en-US" sz="6000" dirty="0">
+                <a:solidFill>
+                  <a:schemeClr val="bg1"/>
+                </a:solidFill>
+              </a:rPr>
+              <a:t>Box Model</a:t>
+            </a:r>
+            <a:endParaRPr lang="en-US" altLang="en-US" sz="6000" b="1" dirty="0">
+              <a:solidFill>
+                <a:schemeClr val="bg1"/>
+              </a:solidFill>
+              <a:latin typeface="Calibri (Body)"/>
+            </a:endParaRPr>
+          </a:p>
+        </p:txBody>
+      </p:sp>
+    </p:spTree>
+    <p:extLst>
+      <p:ext uri="{BB962C8B-B14F-4D97-AF65-F5344CB8AC3E}">
+        <p14:creationId xmlns:p14="http://schemas.microsoft.com/office/powerpoint/2010/main" val="3694379837"/>
+      </p:ext>
+    </p:extLst>
+  </p:cSld>
+  <p:clrMapOvr>
+    <a:masterClrMapping/>
+  </p:clrMapOvr>
+  <mc:AlternateContent xmlns:mc="http://schemas.openxmlformats.org/markup-compatibility/2006" xmlns:p14="http://schemas.microsoft.com/office/powerpoint/2010/main">
+    <mc:Choice Requires="p14">
+      <p:transition spd="med" p14:dur="700">
+        <p:fade/>
+      </p:transition>
+    </mc:Choice>
+    <mc:Fallback xmlns="">
+      <p:transition xmlns:p14="http://schemas.microsoft.com/office/powerpoint/2010/main" spd="med">
+        <p:fade/>
+      </p:transition>
+    </mc:Fallback>
+  </mc:AlternateContent>
+</p:sld>
+</file>
+
+<file path=ppt/slides/slide5.xml><?xml version="1.0" encoding="utf-8"?>
+<p:sld xmlns:a="http://schemas.openxmlformats.org/drawingml/2006/main" xmlns:r="http://schemas.openxmlformats.org/officeDocument/2006/relationships" xmlns:p="http://schemas.openxmlformats.org/presentationml/2006/main">
+  <p:cSld>
+    <p:spTree>
+      <p:nvGrpSpPr>
+        <p:cNvPr id="1" name=""/>
+        <p:cNvGrpSpPr/>
+        <p:nvPr/>
+      </p:nvGrpSpPr>
+      <p:grpSpPr>
+        <a:xfrm>
+          <a:off x="0" y="0"/>
+          <a:ext cx="0" cy="0"/>
+          <a:chOff x="0" y="0"/>
+          <a:chExt cx="0" cy="0"/>
+        </a:xfrm>
+      </p:grpSpPr>
+      <p:sp>
+        <p:nvSpPr>
+          <p:cNvPr id="6" name="Rectangle 5"/>
+          <p:cNvSpPr/>
+          <p:nvPr/>
+        </p:nvSpPr>
+        <p:spPr>
+          <a:xfrm>
+            <a:off x="-215115" y="0"/>
+            <a:ext cx="12407115" cy="6858000"/>
+          </a:xfrm>
+          <a:prstGeom prst="rect">
+            <a:avLst/>
+          </a:prstGeom>
+          <a:solidFill>
+            <a:schemeClr val="accent1">
+              <a:lumMod val="75000"/>
+            </a:schemeClr>
+          </a:solidFill>
+          <a:ln>
+            <a:noFill/>
+          </a:ln>
+        </p:spPr>
+        <p:style>
+          <a:lnRef idx="1">
+            <a:schemeClr val="accent1"/>
+          </a:lnRef>
+          <a:fillRef idx="3">
+            <a:schemeClr val="accent1"/>
+          </a:fillRef>
+          <a:effectRef idx="2">
+            <a:schemeClr val="accent1"/>
+          </a:effectRef>
+          <a:fontRef idx="minor">
+            <a:schemeClr val="lt1"/>
+          </a:fontRef>
+        </p:style>
+        <p:txBody>
+          <a:bodyPr rtlCol="0" anchor="ctr"/>
+          <a:lstStyle/>
+          <a:p>
+            <a:pPr algn="ctr"/>
+            <a:endParaRPr lang="en-US" sz="2400"/>
+          </a:p>
+        </p:txBody>
+      </p:sp>
+      <p:sp>
+        <p:nvSpPr>
+          <p:cNvPr id="24" name="Title 1"/>
+          <p:cNvSpPr>
+            <a:spLocks noGrp="1"/>
+          </p:cNvSpPr>
+          <p:nvPr>
+            <p:ph type="title"/>
+          </p:nvPr>
+        </p:nvSpPr>
+        <p:spPr>
+          <a:xfrm>
+            <a:off x="502042" y="1936377"/>
+            <a:ext cx="10972800" cy="2985246"/>
+          </a:xfrm>
+        </p:spPr>
+        <p:txBody>
+          <a:bodyPr>
+            <a:noAutofit/>
+          </a:bodyPr>
+          <a:lstStyle/>
+          <a:p>
+            <a:pPr algn="ctr" rtl="0" eaLnBrk="0" fontAlgn="base" hangingPunct="0">
+              <a:spcAft>
+                <a:spcPct val="0"/>
+              </a:spcAft>
+            </a:pPr>
+            <a:r>
+              <a:rPr lang="en-US" sz="6000" dirty="0">
+                <a:solidFill>
+                  <a:schemeClr val="bg1"/>
+                </a:solidFill>
+              </a:rPr>
+              <a:t>CSS Sizing Units</a:t>
+            </a:r>
+            <a:endParaRPr lang="en-US" altLang="en-US" sz="6000" b="1" dirty="0">
+              <a:solidFill>
+                <a:schemeClr val="bg1"/>
+              </a:solidFill>
+              <a:latin typeface="Calibri (Body)"/>
+            </a:endParaRPr>
+          </a:p>
+        </p:txBody>
+      </p:sp>
+    </p:spTree>
+    <p:extLst>
+      <p:ext uri="{BB962C8B-B14F-4D97-AF65-F5344CB8AC3E}">
+        <p14:creationId xmlns:p14="http://schemas.microsoft.com/office/powerpoint/2010/main" val="3719101146"/>
+      </p:ext>
+    </p:extLst>
+  </p:cSld>
+  <p:clrMapOvr>
+    <a:masterClrMapping/>
+  </p:clrMapOvr>
+  <mc:AlternateContent xmlns:mc="http://schemas.openxmlformats.org/markup-compatibility/2006" xmlns:p14="http://schemas.microsoft.com/office/powerpoint/2010/main">
+    <mc:Choice Requires="p14">
+      <p:transition spd="med" p14:dur="700">
+        <p:fade/>
+      </p:transition>
+    </mc:Choice>
+    <mc:Fallback xmlns="">
+      <p:transition xmlns:p14="http://schemas.microsoft.com/office/powerpoint/2010/main" spd="med">
+        <p:fade/>
+      </p:transition>
+    </mc:Fallback>
+  </mc:AlternateContent>
+</p:sld>
+</file>
+
+<file path=ppt/slides/slide6.xml><?xml version="1.0" encoding="utf-8"?>
+<p:sld xmlns:a="http://schemas.openxmlformats.org/drawingml/2006/main" xmlns:r="http://schemas.openxmlformats.org/officeDocument/2006/relationships" xmlns:p="http://schemas.openxmlformats.org/presentationml/2006/main">
+  <p:cSld>
+    <p:spTree>
+      <p:nvGrpSpPr>
+        <p:cNvPr id="1" name=""/>
+        <p:cNvGrpSpPr/>
+        <p:nvPr/>
+      </p:nvGrpSpPr>
+      <p:grpSpPr>
+        <a:xfrm>
+          <a:off x="0" y="0"/>
+          <a:ext cx="0" cy="0"/>
+          <a:chOff x="0" y="0"/>
+          <a:chExt cx="0" cy="0"/>
+        </a:xfrm>
+      </p:grpSpPr>
+      <p:sp>
+        <p:nvSpPr>
+          <p:cNvPr id="6" name="Rectangle 5"/>
+          <p:cNvSpPr/>
+          <p:nvPr/>
+        </p:nvSpPr>
+        <p:spPr>
+          <a:xfrm>
+            <a:off x="-215115" y="0"/>
+            <a:ext cx="12407115" cy="6858000"/>
+          </a:xfrm>
+          <a:prstGeom prst="rect">
+            <a:avLst/>
+          </a:prstGeom>
+          <a:solidFill>
+            <a:schemeClr val="accent1">
+              <a:lumMod val="75000"/>
+            </a:schemeClr>
+          </a:solidFill>
+          <a:ln>
+            <a:noFill/>
+          </a:ln>
+        </p:spPr>
+        <p:style>
+          <a:lnRef idx="1">
+            <a:schemeClr val="accent1"/>
+          </a:lnRef>
+          <a:fillRef idx="3">
+            <a:schemeClr val="accent1"/>
+          </a:fillRef>
+          <a:effectRef idx="2">
+            <a:schemeClr val="accent1"/>
+          </a:effectRef>
+          <a:fontRef idx="minor">
+            <a:schemeClr val="lt1"/>
+          </a:fontRef>
+        </p:style>
+        <p:txBody>
+          <a:bodyPr rtlCol="0" anchor="ctr"/>
+          <a:lstStyle/>
+          <a:p>
+            <a:pPr algn="ctr"/>
+            <a:endParaRPr lang="en-US" sz="2400"/>
+          </a:p>
+        </p:txBody>
+      </p:sp>
+      <p:sp>
+        <p:nvSpPr>
+          <p:cNvPr id="24" name="Title 1"/>
+          <p:cNvSpPr>
+            <a:spLocks noGrp="1"/>
+          </p:cNvSpPr>
+          <p:nvPr>
+            <p:ph type="title"/>
+          </p:nvPr>
+        </p:nvSpPr>
+        <p:spPr>
+          <a:xfrm>
+            <a:off x="502042" y="1936377"/>
+            <a:ext cx="10972800" cy="2985246"/>
+          </a:xfrm>
+        </p:spPr>
+        <p:txBody>
+          <a:bodyPr>
+            <a:noAutofit/>
+          </a:bodyPr>
+          <a:lstStyle/>
+          <a:p>
+            <a:pPr algn="ctr" rtl="0" eaLnBrk="0" fontAlgn="base" hangingPunct="0">
+              <a:spcAft>
+                <a:spcPct val="0"/>
+              </a:spcAft>
+            </a:pPr>
+            <a:r>
+              <a:rPr lang="en-US" sz="6000" dirty="0">
+                <a:solidFill>
+                  <a:schemeClr val="bg1"/>
+                </a:solidFill>
+              </a:rPr>
+              <a:t>CSS Display</a:t>
+            </a:r>
+            <a:endParaRPr lang="en-US" altLang="en-US" sz="6000" b="1" dirty="0">
+              <a:solidFill>
+                <a:schemeClr val="bg1"/>
+              </a:solidFill>
+              <a:latin typeface="Calibri (Body)"/>
+            </a:endParaRPr>
+          </a:p>
+        </p:txBody>
+      </p:sp>
+    </p:spTree>
+    <p:extLst>
+      <p:ext uri="{BB962C8B-B14F-4D97-AF65-F5344CB8AC3E}">
+        <p14:creationId xmlns:p14="http://schemas.microsoft.com/office/powerpoint/2010/main" val="2836695452"/>
       </p:ext>
     </p:extLst>
   </p:cSld>

</xml_diff>

<commit_message>
add handson to presentation
</commit_message>
<xml_diff>
--- a/presentations/chapter-3/Practical Web Dev.pptx
+++ b/presentations/chapter-3/Practical Web Dev.pptx
@@ -236,7 +236,7 @@
           <a:p>
             <a:fld id="{B53C1D94-E0DD-4250-8C1B-3D8C3DA9B2B6}" type="datetimeFigureOut">
               <a:rPr lang="he-IL" smtClean="0"/>
-              <a:t>י"ט/תמוז/תשע"ט</a:t>
+              <a:t>כ"א/תמוז/תשע"ט</a:t>
             </a:fld>
             <a:endParaRPr lang="he-IL"/>
           </a:p>
@@ -3496,7 +3496,7 @@
             </a:pPr>
             <a:r>
               <a:rPr lang="en-US" b="0" dirty="0"/>
-              <a:t>Explain what is layout?</a:t>
+              <a:t>What is a layout?</a:t>
             </a:r>
           </a:p>
           <a:p>
@@ -3517,6 +3517,98 @@
               <a:tabLst/>
               <a:defRPr/>
             </a:pPr>
+            <a:r>
+              <a:rPr lang="en-US" b="0" dirty="0"/>
+              <a:t>It’s how we are/will arrange view.</a:t>
+            </a:r>
+          </a:p>
+          <a:p>
+            <a:pPr marL="0" marR="0" lvl="0" indent="0" algn="l" defTabSz="914400" rtl="0" eaLnBrk="1" fontAlgn="auto" latinLnBrk="0" hangingPunct="1">
+              <a:lnSpc>
+                <a:spcPct val="100000"/>
+              </a:lnSpc>
+              <a:spcBef>
+                <a:spcPts val="0"/>
+              </a:spcBef>
+              <a:spcAft>
+                <a:spcPts val="0"/>
+              </a:spcAft>
+              <a:buClrTx/>
+              <a:buSzTx/>
+              <a:buFontTx/>
+              <a:buNone/>
+              <a:tabLst/>
+              <a:defRPr/>
+            </a:pPr>
+            <a:r>
+              <a:rPr lang="en-US" b="0" dirty="0"/>
+              <a:t>The structure which will not be change and will follow us for a few routes.</a:t>
+            </a:r>
+          </a:p>
+          <a:p>
+            <a:pPr marL="0" marR="0" lvl="0" indent="0" algn="l" defTabSz="914400" rtl="0" eaLnBrk="1" fontAlgn="auto" latinLnBrk="0" hangingPunct="1">
+              <a:lnSpc>
+                <a:spcPct val="100000"/>
+              </a:lnSpc>
+              <a:spcBef>
+                <a:spcPts val="0"/>
+              </a:spcBef>
+              <a:spcAft>
+                <a:spcPts val="0"/>
+              </a:spcAft>
+              <a:buClrTx/>
+              <a:buSzTx/>
+              <a:buFontTx/>
+              <a:buNone/>
+              <a:tabLst/>
+              <a:defRPr/>
+            </a:pPr>
+            <a:r>
+              <a:rPr lang="en-US" b="0" dirty="0"/>
+              <a:t>For example header and footer are part of our layout but specific view for specific route is not a layout.</a:t>
+            </a:r>
+          </a:p>
+          <a:p>
+            <a:pPr marL="0" marR="0" lvl="0" indent="0" algn="l" defTabSz="914400" rtl="0" eaLnBrk="1" fontAlgn="auto" latinLnBrk="0" hangingPunct="1">
+              <a:lnSpc>
+                <a:spcPct val="100000"/>
+              </a:lnSpc>
+              <a:spcBef>
+                <a:spcPts val="0"/>
+              </a:spcBef>
+              <a:spcAft>
+                <a:spcPts val="0"/>
+              </a:spcAft>
+              <a:buClrTx/>
+              <a:buSzTx/>
+              <a:buFontTx/>
+              <a:buNone/>
+              <a:tabLst/>
+              <a:defRPr/>
+            </a:pPr>
+            <a:r>
+              <a:rPr lang="en-US" b="0" dirty="0"/>
+              <a:t>Layout can be sub layout for example if we have checkout flow and we have wizard on the top of each part of the flow then it’s part of our layout</a:t>
+            </a:r>
+          </a:p>
+          <a:p>
+            <a:pPr marL="0" marR="0" lvl="0" indent="0" algn="l" defTabSz="914400" rtl="0" eaLnBrk="1" fontAlgn="auto" latinLnBrk="0" hangingPunct="1">
+              <a:lnSpc>
+                <a:spcPct val="100000"/>
+              </a:lnSpc>
+              <a:spcBef>
+                <a:spcPts val="0"/>
+              </a:spcBef>
+              <a:spcAft>
+                <a:spcPts val="0"/>
+              </a:spcAft>
+              <a:buClrTx/>
+              <a:buSzTx/>
+              <a:buFontTx/>
+              <a:buNone/>
+              <a:tabLst/>
+              <a:defRPr/>
+            </a:pPr>
             <a:endParaRPr lang="en-US" b="0" dirty="0"/>
           </a:p>
           <a:p>
@@ -3539,7 +3631,7 @@
             </a:pPr>
             <a:r>
               <a:rPr lang="en-US" b="0" dirty="0"/>
-              <a:t>Show images from website and explain what will be the layout for each one.</a:t>
+              <a:t>Let’s see an examples:</a:t>
             </a:r>
           </a:p>
           <a:p>
@@ -3562,7 +3654,228 @@
             </a:pPr>
             <a:r>
               <a:rPr lang="en-US" b="0" dirty="0"/>
-              <a:t>Mark layout areas in thus images so developers will know how recognize layouts.</a:t>
+              <a:t>In electron site what will be the layout?</a:t>
+            </a:r>
+          </a:p>
+          <a:p>
+            <a:pPr marL="0" marR="0" lvl="0" indent="0" algn="l" defTabSz="914400" rtl="0" eaLnBrk="1" fontAlgn="auto" latinLnBrk="0" hangingPunct="1">
+              <a:lnSpc>
+                <a:spcPct val="100000"/>
+              </a:lnSpc>
+              <a:spcBef>
+                <a:spcPts val="0"/>
+              </a:spcBef>
+              <a:spcAft>
+                <a:spcPts val="0"/>
+              </a:spcAft>
+              <a:buClrTx/>
+              <a:buSzTx/>
+              <a:buFontTx/>
+              <a:buNone/>
+              <a:tabLst/>
+              <a:defRPr/>
+            </a:pPr>
+            <a:r>
+              <a:rPr lang="en-US" b="0" dirty="0"/>
+              <a:t>Header, side bar &amp; content</a:t>
+            </a:r>
+          </a:p>
+          <a:p>
+            <a:pPr marL="0" marR="0" lvl="0" indent="0" algn="l" defTabSz="914400" rtl="0" eaLnBrk="1" fontAlgn="auto" latinLnBrk="0" hangingPunct="1">
+              <a:lnSpc>
+                <a:spcPct val="100000"/>
+              </a:lnSpc>
+              <a:spcBef>
+                <a:spcPts val="0"/>
+              </a:spcBef>
+              <a:spcAft>
+                <a:spcPts val="0"/>
+              </a:spcAft>
+              <a:buClrTx/>
+              <a:buSzTx/>
+              <a:buFontTx/>
+              <a:buNone/>
+              <a:tabLst/>
+              <a:defRPr/>
+            </a:pPr>
+            <a:endParaRPr lang="en-US" b="0" dirty="0"/>
+          </a:p>
+          <a:p>
+            <a:pPr marL="0" marR="0" lvl="0" indent="0" algn="l" defTabSz="914400" rtl="0" eaLnBrk="1" fontAlgn="auto" latinLnBrk="0" hangingPunct="1">
+              <a:lnSpc>
+                <a:spcPct val="100000"/>
+              </a:lnSpc>
+              <a:spcBef>
+                <a:spcPts val="0"/>
+              </a:spcBef>
+              <a:spcAft>
+                <a:spcPts val="0"/>
+              </a:spcAft>
+              <a:buClrTx/>
+              <a:buSzTx/>
+              <a:buFontTx/>
+              <a:buNone/>
+              <a:tabLst/>
+              <a:defRPr/>
+            </a:pPr>
+            <a:r>
+              <a:rPr lang="en-US" b="0" dirty="0"/>
+              <a:t>In market place what will be the layout?</a:t>
+            </a:r>
+          </a:p>
+          <a:p>
+            <a:pPr marL="0" marR="0" lvl="0" indent="0" algn="l" defTabSz="914400" rtl="0" eaLnBrk="1" fontAlgn="auto" latinLnBrk="0" hangingPunct="1">
+              <a:lnSpc>
+                <a:spcPct val="100000"/>
+              </a:lnSpc>
+              <a:spcBef>
+                <a:spcPts val="0"/>
+              </a:spcBef>
+              <a:spcAft>
+                <a:spcPts val="0"/>
+              </a:spcAft>
+              <a:buClrTx/>
+              <a:buSzTx/>
+              <a:buFontTx/>
+              <a:buNone/>
+              <a:tabLst/>
+              <a:defRPr/>
+            </a:pPr>
+            <a:r>
+              <a:rPr lang="en-US" b="0" dirty="0"/>
+              <a:t>Header, footer, content &amp; breadcrumb</a:t>
+            </a:r>
+          </a:p>
+          <a:p>
+            <a:pPr marL="0" marR="0" lvl="0" indent="0" algn="l" defTabSz="914400" rtl="0" eaLnBrk="1" fontAlgn="auto" latinLnBrk="0" hangingPunct="1">
+              <a:lnSpc>
+                <a:spcPct val="100000"/>
+              </a:lnSpc>
+              <a:spcBef>
+                <a:spcPts val="0"/>
+              </a:spcBef>
+              <a:spcAft>
+                <a:spcPts val="0"/>
+              </a:spcAft>
+              <a:buClrTx/>
+              <a:buSzTx/>
+              <a:buFontTx/>
+              <a:buNone/>
+              <a:tabLst/>
+              <a:defRPr/>
+            </a:pPr>
+            <a:endParaRPr lang="en-US" b="0" dirty="0"/>
+          </a:p>
+          <a:p>
+            <a:pPr marL="0" marR="0" lvl="0" indent="0" algn="l" defTabSz="914400" rtl="0" eaLnBrk="1" fontAlgn="auto" latinLnBrk="0" hangingPunct="1">
+              <a:lnSpc>
+                <a:spcPct val="100000"/>
+              </a:lnSpc>
+              <a:spcBef>
+                <a:spcPts val="0"/>
+              </a:spcBef>
+              <a:spcAft>
+                <a:spcPts val="0"/>
+              </a:spcAft>
+              <a:buClrTx/>
+              <a:buSzTx/>
+              <a:buFontTx/>
+              <a:buNone/>
+              <a:tabLst/>
+              <a:defRPr/>
+            </a:pPr>
+            <a:r>
+              <a:rPr lang="en-US" b="0" dirty="0"/>
+              <a:t>In marketplace at checkout flow:</a:t>
+            </a:r>
+          </a:p>
+          <a:p>
+            <a:pPr marL="0" marR="0" lvl="0" indent="0" algn="l" defTabSz="914400" rtl="0" eaLnBrk="1" fontAlgn="auto" latinLnBrk="0" hangingPunct="1">
+              <a:lnSpc>
+                <a:spcPct val="100000"/>
+              </a:lnSpc>
+              <a:spcBef>
+                <a:spcPts val="0"/>
+              </a:spcBef>
+              <a:spcAft>
+                <a:spcPts val="0"/>
+              </a:spcAft>
+              <a:buClrTx/>
+              <a:buSzTx/>
+              <a:buFontTx/>
+              <a:buNone/>
+              <a:tabLst/>
+              <a:defRPr/>
+            </a:pPr>
+            <a:r>
+              <a:rPr lang="en-US" b="0" dirty="0"/>
+              <a:t>Wizard, payment side bar, content</a:t>
+            </a:r>
+          </a:p>
+          <a:p>
+            <a:pPr marL="0" marR="0" lvl="0" indent="0" algn="l" defTabSz="914400" rtl="0" eaLnBrk="1" fontAlgn="auto" latinLnBrk="0" hangingPunct="1">
+              <a:lnSpc>
+                <a:spcPct val="100000"/>
+              </a:lnSpc>
+              <a:spcBef>
+                <a:spcPts val="0"/>
+              </a:spcBef>
+              <a:spcAft>
+                <a:spcPts val="0"/>
+              </a:spcAft>
+              <a:buClrTx/>
+              <a:buSzTx/>
+              <a:buFontTx/>
+              <a:buNone/>
+              <a:tabLst/>
+              <a:defRPr/>
+            </a:pPr>
+            <a:endParaRPr lang="en-US" b="0" dirty="0"/>
+          </a:p>
+          <a:p>
+            <a:pPr marL="0" marR="0" lvl="0" indent="0" algn="l" defTabSz="914400" rtl="0" eaLnBrk="1" fontAlgn="auto" latinLnBrk="0" hangingPunct="1">
+              <a:lnSpc>
+                <a:spcPct val="100000"/>
+              </a:lnSpc>
+              <a:spcBef>
+                <a:spcPts val="0"/>
+              </a:spcBef>
+              <a:spcAft>
+                <a:spcPts val="0"/>
+              </a:spcAft>
+              <a:buClrTx/>
+              <a:buSzTx/>
+              <a:buFontTx/>
+              <a:buNone/>
+              <a:tabLst/>
+              <a:defRPr/>
+            </a:pPr>
+            <a:r>
+              <a:rPr lang="en-US" b="0" dirty="0"/>
+              <a:t>In our application:</a:t>
+            </a:r>
+          </a:p>
+          <a:p>
+            <a:pPr marL="0" marR="0" lvl="0" indent="0" algn="l" defTabSz="914400" rtl="0" eaLnBrk="1" fontAlgn="auto" latinLnBrk="0" hangingPunct="1">
+              <a:lnSpc>
+                <a:spcPct val="100000"/>
+              </a:lnSpc>
+              <a:spcBef>
+                <a:spcPts val="0"/>
+              </a:spcBef>
+              <a:spcAft>
+                <a:spcPts val="0"/>
+              </a:spcAft>
+              <a:buClrTx/>
+              <a:buSzTx/>
+              <a:buFontTx/>
+              <a:buNone/>
+              <a:tabLst/>
+              <a:defRPr/>
+            </a:pPr>
+            <a:r>
+              <a:rPr lang="en-US" b="0" dirty="0"/>
+              <a:t>Header, footer, sidebar &amp; content</a:t>
             </a:r>
           </a:p>
         </p:txBody>
@@ -3836,7 +4149,7 @@
           <a:p>
             <a:fld id="{F472E424-CC75-4448-A1B5-6FCA6BFEE599}" type="datetimeFigureOut">
               <a:rPr lang="he-IL" smtClean="0"/>
-              <a:t>י"ט/תמוז/תשע"ט</a:t>
+              <a:t>כ"א/תמוז/תשע"ט</a:t>
             </a:fld>
             <a:endParaRPr lang="he-IL"/>
           </a:p>
@@ -4004,7 +4317,7 @@
           <a:p>
             <a:fld id="{F472E424-CC75-4448-A1B5-6FCA6BFEE599}" type="datetimeFigureOut">
               <a:rPr lang="he-IL" smtClean="0"/>
-              <a:t>י"ט/תמוז/תשע"ט</a:t>
+              <a:t>כ"א/תמוז/תשע"ט</a:t>
             </a:fld>
             <a:endParaRPr lang="he-IL"/>
           </a:p>
@@ -4182,7 +4495,7 @@
           <a:p>
             <a:fld id="{F472E424-CC75-4448-A1B5-6FCA6BFEE599}" type="datetimeFigureOut">
               <a:rPr lang="he-IL" smtClean="0"/>
-              <a:t>י"ט/תמוז/תשע"ט</a:t>
+              <a:t>כ"א/תמוז/תשע"ט</a:t>
             </a:fld>
             <a:endParaRPr lang="he-IL"/>
           </a:p>
@@ -4350,7 +4663,7 @@
           <a:p>
             <a:fld id="{F472E424-CC75-4448-A1B5-6FCA6BFEE599}" type="datetimeFigureOut">
               <a:rPr lang="he-IL" smtClean="0"/>
-              <a:t>י"ט/תמוז/תשע"ט</a:t>
+              <a:t>כ"א/תמוז/תשע"ט</a:t>
             </a:fld>
             <a:endParaRPr lang="he-IL"/>
           </a:p>
@@ -4595,7 +4908,7 @@
           <a:p>
             <a:fld id="{F472E424-CC75-4448-A1B5-6FCA6BFEE599}" type="datetimeFigureOut">
               <a:rPr lang="he-IL" smtClean="0"/>
-              <a:t>י"ט/תמוז/תשע"ט</a:t>
+              <a:t>כ"א/תמוז/תשע"ט</a:t>
             </a:fld>
             <a:endParaRPr lang="he-IL"/>
           </a:p>
@@ -4824,7 +5137,7 @@
           <a:p>
             <a:fld id="{F472E424-CC75-4448-A1B5-6FCA6BFEE599}" type="datetimeFigureOut">
               <a:rPr lang="he-IL" smtClean="0"/>
-              <a:t>י"ט/תמוז/תשע"ט</a:t>
+              <a:t>כ"א/תמוז/תשע"ט</a:t>
             </a:fld>
             <a:endParaRPr lang="he-IL"/>
           </a:p>
@@ -5188,7 +5501,7 @@
           <a:p>
             <a:fld id="{F472E424-CC75-4448-A1B5-6FCA6BFEE599}" type="datetimeFigureOut">
               <a:rPr lang="he-IL" smtClean="0"/>
-              <a:t>י"ט/תמוז/תשע"ט</a:t>
+              <a:t>כ"א/תמוז/תשע"ט</a:t>
             </a:fld>
             <a:endParaRPr lang="he-IL"/>
           </a:p>
@@ -5305,7 +5618,7 @@
           <a:p>
             <a:fld id="{F472E424-CC75-4448-A1B5-6FCA6BFEE599}" type="datetimeFigureOut">
               <a:rPr lang="he-IL" smtClean="0"/>
-              <a:t>י"ט/תמוז/תשע"ט</a:t>
+              <a:t>כ"א/תמוז/תשע"ט</a:t>
             </a:fld>
             <a:endParaRPr lang="he-IL"/>
           </a:p>
@@ -5400,7 +5713,7 @@
           <a:p>
             <a:fld id="{F472E424-CC75-4448-A1B5-6FCA6BFEE599}" type="datetimeFigureOut">
               <a:rPr lang="he-IL" smtClean="0"/>
-              <a:t>י"ט/תמוז/תשע"ט</a:t>
+              <a:t>כ"א/תמוז/תשע"ט</a:t>
             </a:fld>
             <a:endParaRPr lang="he-IL"/>
           </a:p>
@@ -5675,7 +5988,7 @@
           <a:p>
             <a:fld id="{F472E424-CC75-4448-A1B5-6FCA6BFEE599}" type="datetimeFigureOut">
               <a:rPr lang="he-IL" smtClean="0"/>
-              <a:t>י"ט/תמוז/תשע"ט</a:t>
+              <a:t>כ"א/תמוז/תשע"ט</a:t>
             </a:fld>
             <a:endParaRPr lang="he-IL"/>
           </a:p>
@@ -5927,7 +6240,7 @@
           <a:p>
             <a:fld id="{F472E424-CC75-4448-A1B5-6FCA6BFEE599}" type="datetimeFigureOut">
               <a:rPr lang="he-IL" smtClean="0"/>
-              <a:t>י"ט/תמוז/תשע"ט</a:t>
+              <a:t>כ"א/תמוז/תשע"ט</a:t>
             </a:fld>
             <a:endParaRPr lang="he-IL"/>
           </a:p>
@@ -6138,7 +6451,7 @@
           <a:p>
             <a:fld id="{F472E424-CC75-4448-A1B5-6FCA6BFEE599}" type="datetimeFigureOut">
               <a:rPr lang="he-IL" smtClean="0"/>
-              <a:t>י"ט/תמוז/תשע"ט</a:t>
+              <a:t>כ"א/תמוז/תשע"ט</a:t>
             </a:fld>
             <a:endParaRPr lang="he-IL"/>
           </a:p>

</xml_diff>